<commit_message>
powerpoint en website beetje
</commit_message>
<xml_diff>
--- a/Robot met mecanum wheels.pptx
+++ b/Robot met mecanum wheels.pptx
@@ -5,7 +5,7 @@
     <p:sldMasterId id="2147483648" r:id="rId1"/>
   </p:sldMasterIdLst>
   <p:notesMasterIdLst>
-    <p:notesMasterId r:id="rId23"/>
+    <p:notesMasterId r:id="rId25"/>
   </p:notesMasterIdLst>
   <p:sldIdLst>
     <p:sldId id="256" r:id="rId2"/>
@@ -22,13 +22,15 @@
     <p:sldId id="270" r:id="rId13"/>
     <p:sldId id="271" r:id="rId14"/>
     <p:sldId id="272" r:id="rId15"/>
-    <p:sldId id="273" r:id="rId16"/>
-    <p:sldId id="275" r:id="rId17"/>
-    <p:sldId id="274" r:id="rId18"/>
-    <p:sldId id="276" r:id="rId19"/>
-    <p:sldId id="268" r:id="rId20"/>
-    <p:sldId id="266" r:id="rId21"/>
-    <p:sldId id="267" r:id="rId22"/>
+    <p:sldId id="277" r:id="rId16"/>
+    <p:sldId id="278" r:id="rId17"/>
+    <p:sldId id="273" r:id="rId18"/>
+    <p:sldId id="275" r:id="rId19"/>
+    <p:sldId id="274" r:id="rId20"/>
+    <p:sldId id="276" r:id="rId21"/>
+    <p:sldId id="268" r:id="rId22"/>
+    <p:sldId id="266" r:id="rId23"/>
+    <p:sldId id="267" r:id="rId24"/>
   </p:sldIdLst>
   <p:sldSz cx="12192000" cy="6858000"/>
   <p:notesSz cx="6858000" cy="9144000"/>
@@ -987,6 +989,18 @@
   <p:clrMapOvr>
     <a:masterClrMapping/>
   </p:clrMapOvr>
+  <mc:AlternateContent xmlns:mc="http://schemas.openxmlformats.org/markup-compatibility/2006">
+    <mc:Choice xmlns:p159="http://schemas.microsoft.com/office/powerpoint/2015/09/main" Requires="p159">
+      <p:transition xmlns:p14="http://schemas.microsoft.com/office/powerpoint/2010/main" spd="slow" p14:dur="2000">
+        <p159:morph option="byObject"/>
+      </p:transition>
+    </mc:Choice>
+    <mc:Fallback>
+      <p:transition spd="slow">
+        <p:fade/>
+      </p:transition>
+    </mc:Fallback>
+  </mc:AlternateContent>
 </p:sldLayout>
 </file>
 
@@ -1187,6 +1201,18 @@
   <p:clrMapOvr>
     <a:masterClrMapping/>
   </p:clrMapOvr>
+  <mc:AlternateContent xmlns:mc="http://schemas.openxmlformats.org/markup-compatibility/2006">
+    <mc:Choice xmlns:p159="http://schemas.microsoft.com/office/powerpoint/2015/09/main" Requires="p159">
+      <p:transition xmlns:p14="http://schemas.microsoft.com/office/powerpoint/2010/main" spd="slow" p14:dur="2000">
+        <p159:morph option="byObject"/>
+      </p:transition>
+    </mc:Choice>
+    <mc:Fallback>
+      <p:transition spd="slow">
+        <p:fade/>
+      </p:transition>
+    </mc:Fallback>
+  </mc:AlternateContent>
 </p:sldLayout>
 </file>
 
@@ -1397,6 +1423,18 @@
   <p:clrMapOvr>
     <a:masterClrMapping/>
   </p:clrMapOvr>
+  <mc:AlternateContent xmlns:mc="http://schemas.openxmlformats.org/markup-compatibility/2006">
+    <mc:Choice xmlns:p159="http://schemas.microsoft.com/office/powerpoint/2015/09/main" Requires="p159">
+      <p:transition xmlns:p14="http://schemas.microsoft.com/office/powerpoint/2010/main" spd="slow" p14:dur="2000">
+        <p159:morph option="byObject"/>
+      </p:transition>
+    </mc:Choice>
+    <mc:Fallback>
+      <p:transition spd="slow">
+        <p:fade/>
+      </p:transition>
+    </mc:Fallback>
+  </mc:AlternateContent>
 </p:sldLayout>
 </file>
 
@@ -1597,6 +1635,18 @@
   <p:clrMapOvr>
     <a:masterClrMapping/>
   </p:clrMapOvr>
+  <mc:AlternateContent xmlns:mc="http://schemas.openxmlformats.org/markup-compatibility/2006">
+    <mc:Choice xmlns:p159="http://schemas.microsoft.com/office/powerpoint/2015/09/main" Requires="p159">
+      <p:transition xmlns:p14="http://schemas.microsoft.com/office/powerpoint/2010/main" spd="slow" p14:dur="2000">
+        <p159:morph option="byObject"/>
+      </p:transition>
+    </mc:Choice>
+    <mc:Fallback>
+      <p:transition spd="slow">
+        <p:fade/>
+      </p:transition>
+    </mc:Fallback>
+  </mc:AlternateContent>
 </p:sldLayout>
 </file>
 
@@ -1873,6 +1923,18 @@
   <p:clrMapOvr>
     <a:masterClrMapping/>
   </p:clrMapOvr>
+  <mc:AlternateContent xmlns:mc="http://schemas.openxmlformats.org/markup-compatibility/2006">
+    <mc:Choice xmlns:p159="http://schemas.microsoft.com/office/powerpoint/2015/09/main" Requires="p159">
+      <p:transition xmlns:p14="http://schemas.microsoft.com/office/powerpoint/2010/main" spd="slow" p14:dur="2000">
+        <p159:morph option="byObject"/>
+      </p:transition>
+    </mc:Choice>
+    <mc:Fallback>
+      <p:transition spd="slow">
+        <p:fade/>
+      </p:transition>
+    </mc:Fallback>
+  </mc:AlternateContent>
 </p:sldLayout>
 </file>
 
@@ -2141,6 +2203,18 @@
   <p:clrMapOvr>
     <a:masterClrMapping/>
   </p:clrMapOvr>
+  <mc:AlternateContent xmlns:mc="http://schemas.openxmlformats.org/markup-compatibility/2006">
+    <mc:Choice xmlns:p159="http://schemas.microsoft.com/office/powerpoint/2015/09/main" Requires="p159">
+      <p:transition xmlns:p14="http://schemas.microsoft.com/office/powerpoint/2010/main" spd="slow" p14:dur="2000">
+        <p159:morph option="byObject"/>
+      </p:transition>
+    </mc:Choice>
+    <mc:Fallback>
+      <p:transition spd="slow">
+        <p:fade/>
+      </p:transition>
+    </mc:Fallback>
+  </mc:AlternateContent>
 </p:sldLayout>
 </file>
 
@@ -2556,6 +2630,18 @@
   <p:clrMapOvr>
     <a:masterClrMapping/>
   </p:clrMapOvr>
+  <mc:AlternateContent xmlns:mc="http://schemas.openxmlformats.org/markup-compatibility/2006">
+    <mc:Choice xmlns:p159="http://schemas.microsoft.com/office/powerpoint/2015/09/main" Requires="p159">
+      <p:transition xmlns:p14="http://schemas.microsoft.com/office/powerpoint/2010/main" spd="slow" p14:dur="2000">
+        <p159:morph option="byObject"/>
+      </p:transition>
+    </mc:Choice>
+    <mc:Fallback>
+      <p:transition spd="slow">
+        <p:fade/>
+      </p:transition>
+    </mc:Fallback>
+  </mc:AlternateContent>
 </p:sldLayout>
 </file>
 
@@ -2698,6 +2784,18 @@
   <p:clrMapOvr>
     <a:masterClrMapping/>
   </p:clrMapOvr>
+  <mc:AlternateContent xmlns:mc="http://schemas.openxmlformats.org/markup-compatibility/2006">
+    <mc:Choice xmlns:p159="http://schemas.microsoft.com/office/powerpoint/2015/09/main" Requires="p159">
+      <p:transition xmlns:p14="http://schemas.microsoft.com/office/powerpoint/2010/main" spd="slow" p14:dur="2000">
+        <p159:morph option="byObject"/>
+      </p:transition>
+    </mc:Choice>
+    <mc:Fallback>
+      <p:transition spd="slow">
+        <p:fade/>
+      </p:transition>
+    </mc:Fallback>
+  </mc:AlternateContent>
 </p:sldLayout>
 </file>
 
@@ -2811,6 +2909,18 @@
   <p:clrMapOvr>
     <a:masterClrMapping/>
   </p:clrMapOvr>
+  <mc:AlternateContent xmlns:mc="http://schemas.openxmlformats.org/markup-compatibility/2006">
+    <mc:Choice xmlns:p159="http://schemas.microsoft.com/office/powerpoint/2015/09/main" Requires="p159">
+      <p:transition xmlns:p14="http://schemas.microsoft.com/office/powerpoint/2010/main" spd="slow" p14:dur="2000">
+        <p159:morph option="byObject"/>
+      </p:transition>
+    </mc:Choice>
+    <mc:Fallback>
+      <p:transition spd="slow">
+        <p:fade/>
+      </p:transition>
+    </mc:Fallback>
+  </mc:AlternateContent>
 </p:sldLayout>
 </file>
 
@@ -3124,6 +3234,18 @@
   <p:clrMapOvr>
     <a:masterClrMapping/>
   </p:clrMapOvr>
+  <mc:AlternateContent xmlns:mc="http://schemas.openxmlformats.org/markup-compatibility/2006">
+    <mc:Choice xmlns:p159="http://schemas.microsoft.com/office/powerpoint/2015/09/main" Requires="p159">
+      <p:transition xmlns:p14="http://schemas.microsoft.com/office/powerpoint/2010/main" spd="slow" p14:dur="2000">
+        <p159:morph option="byObject"/>
+      </p:transition>
+    </mc:Choice>
+    <mc:Fallback>
+      <p:transition spd="slow">
+        <p:fade/>
+      </p:transition>
+    </mc:Fallback>
+  </mc:AlternateContent>
 </p:sldLayout>
 </file>
 
@@ -3413,6 +3535,18 @@
   <p:clrMapOvr>
     <a:masterClrMapping/>
   </p:clrMapOvr>
+  <mc:AlternateContent xmlns:mc="http://schemas.openxmlformats.org/markup-compatibility/2006">
+    <mc:Choice xmlns:p159="http://schemas.microsoft.com/office/powerpoint/2015/09/main" Requires="p159">
+      <p:transition xmlns:p14="http://schemas.microsoft.com/office/powerpoint/2010/main" spd="slow" p14:dur="2000">
+        <p159:morph option="byObject"/>
+      </p:transition>
+    </mc:Choice>
+    <mc:Fallback>
+      <p:transition spd="slow">
+        <p:fade/>
+      </p:transition>
+    </mc:Fallback>
+  </mc:AlternateContent>
 </p:sldLayout>
 </file>
 
@@ -3703,6 +3837,18 @@
     <p:sldLayoutId id="2147483658" r:id="rId10"/>
     <p:sldLayoutId id="2147483659" r:id="rId11"/>
   </p:sldLayoutIdLst>
+  <mc:AlternateContent xmlns:mc="http://schemas.openxmlformats.org/markup-compatibility/2006">
+    <mc:Choice xmlns:p159="http://schemas.microsoft.com/office/powerpoint/2015/09/main" Requires="p159">
+      <p:transition xmlns:p14="http://schemas.microsoft.com/office/powerpoint/2010/main" spd="slow" p14:dur="2000">
+        <p159:morph option="byObject"/>
+      </p:transition>
+    </mc:Choice>
+    <mc:Fallback>
+      <p:transition spd="slow">
+        <p:fade/>
+      </p:transition>
+    </mc:Fallback>
+  </mc:AlternateContent>
   <p:hf hdr="0" dt="0"/>
   <p:txStyles>
     <p:titleStyle>
@@ -4266,214 +4412,18 @@
   <p:clrMapOvr>
     <a:overrideClrMapping bg1="dk1" tx1="lt1" bg2="dk2" tx2="lt2" accent1="accent1" accent2="accent2" accent3="accent3" accent4="accent4" accent5="accent5" accent6="accent6" hlink="hlink" folHlink="folHlink"/>
   </p:clrMapOvr>
-  <mc:AlternateContent xmlns:mc="http://schemas.openxmlformats.org/markup-compatibility/2006" xmlns:p15="http://schemas.microsoft.com/office/powerpoint/2012/main">
-    <mc:Choice Requires="p15">
-      <p:transition xmlns:p14="http://schemas.microsoft.com/office/powerpoint/2010/main" spd="slow" p14:dur="5000">
-        <p15:prstTrans prst="curtains"/>
+  <mc:AlternateContent xmlns:mc="http://schemas.openxmlformats.org/markup-compatibility/2006">
+    <mc:Choice xmlns:p159="http://schemas.microsoft.com/office/powerpoint/2015/09/main" Requires="p159">
+      <p:transition xmlns:p14="http://schemas.microsoft.com/office/powerpoint/2010/main" spd="slow" p14:dur="2000">
+        <p159:morph option="byObject"/>
       </p:transition>
     </mc:Choice>
-    <mc:Fallback xmlns="">
+    <mc:Fallback>
       <p:transition spd="slow">
         <p:fade/>
       </p:transition>
     </mc:Fallback>
   </mc:AlternateContent>
-  <p:timing>
-    <p:tnLst>
-      <p:par>
-        <p:cTn id="1" dur="indefinite" restart="never" nodeType="tmRoot">
-          <p:childTnLst>
-            <p:seq concurrent="1" nextAc="seek">
-              <p:cTn id="2" dur="indefinite" nodeType="mainSeq">
-                <p:childTnLst>
-                  <p:par>
-                    <p:cTn id="3" fill="hold">
-                      <p:stCondLst>
-                        <p:cond delay="indefinite"/>
-                        <p:cond evt="onBegin" delay="0">
-                          <p:tn val="2"/>
-                        </p:cond>
-                      </p:stCondLst>
-                      <p:childTnLst>
-                        <p:par>
-                          <p:cTn id="4" fill="hold">
-                            <p:stCondLst>
-                              <p:cond delay="0"/>
-                            </p:stCondLst>
-                            <p:childTnLst>
-                              <p:par>
-                                <p:cTn id="5" presetID="10" presetClass="entr" presetSubtype="0" fill="hold" grpId="0" nodeType="withEffect">
-                                  <p:stCondLst>
-                                    <p:cond delay="1000"/>
-                                  </p:stCondLst>
-                                  <p:iterate type="lt">
-                                    <p:tmPct val="10000"/>
-                                  </p:iterate>
-                                  <p:childTnLst>
-                                    <p:set>
-                                      <p:cBhvr>
-                                        <p:cTn id="6" dur="1" fill="hold">
-                                          <p:stCondLst>
-                                            <p:cond delay="0"/>
-                                          </p:stCondLst>
-                                        </p:cTn>
-                                        <p:tgtEl>
-                                          <p:spTgt spid="2"/>
-                                        </p:tgtEl>
-                                        <p:attrNameLst>
-                                          <p:attrName>style.visibility</p:attrName>
-                                        </p:attrNameLst>
-                                      </p:cBhvr>
-                                      <p:to>
-                                        <p:strVal val="visible"/>
-                                      </p:to>
-                                    </p:set>
-                                    <p:animEffect transition="in" filter="fade">
-                                      <p:cBhvr>
-                                        <p:cTn id="7" dur="400"/>
-                                        <p:tgtEl>
-                                          <p:spTgt spid="2"/>
-                                        </p:tgtEl>
-                                      </p:cBhvr>
-                                    </p:animEffect>
-                                  </p:childTnLst>
-                                </p:cTn>
-                              </p:par>
-                            </p:childTnLst>
-                          </p:cTn>
-                        </p:par>
-                      </p:childTnLst>
-                    </p:cTn>
-                  </p:par>
-                  <p:par>
-                    <p:cTn id="8" fill="hold">
-                      <p:stCondLst>
-                        <p:cond delay="indefinite"/>
-                      </p:stCondLst>
-                      <p:childTnLst>
-                        <p:par>
-                          <p:cTn id="9" fill="hold">
-                            <p:stCondLst>
-                              <p:cond delay="0"/>
-                            </p:stCondLst>
-                            <p:childTnLst>
-                              <p:par>
-                                <p:cTn id="10" presetID="10" presetClass="entr" presetSubtype="0" fill="hold" nodeType="clickEffect">
-                                  <p:stCondLst>
-                                    <p:cond delay="0"/>
-                                  </p:stCondLst>
-                                  <p:childTnLst>
-                                    <p:set>
-                                      <p:cBhvr>
-                                        <p:cTn id="11" dur="1" fill="hold">
-                                          <p:stCondLst>
-                                            <p:cond delay="0"/>
-                                          </p:stCondLst>
-                                        </p:cTn>
-                                        <p:tgtEl>
-                                          <p:spTgt spid="3">
-                                            <p:txEl>
-                                              <p:pRg st="0" end="0"/>
-                                            </p:txEl>
-                                          </p:spTgt>
-                                        </p:tgtEl>
-                                        <p:attrNameLst>
-                                          <p:attrName>style.visibility</p:attrName>
-                                        </p:attrNameLst>
-                                      </p:cBhvr>
-                                      <p:to>
-                                        <p:strVal val="visible"/>
-                                      </p:to>
-                                    </p:set>
-                                    <p:animEffect transition="in" filter="fade">
-                                      <p:cBhvr>
-                                        <p:cTn id="12" dur="500"/>
-                                        <p:tgtEl>
-                                          <p:spTgt spid="3">
-                                            <p:txEl>
-                                              <p:pRg st="0" end="0"/>
-                                            </p:txEl>
-                                          </p:spTgt>
-                                        </p:tgtEl>
-                                      </p:cBhvr>
-                                    </p:animEffect>
-                                  </p:childTnLst>
-                                </p:cTn>
-                              </p:par>
-                              <p:par>
-                                <p:cTn id="13" presetID="10" presetClass="entr" presetSubtype="0" fill="hold" nodeType="withEffect">
-                                  <p:stCondLst>
-                                    <p:cond delay="0"/>
-                                  </p:stCondLst>
-                                  <p:childTnLst>
-                                    <p:set>
-                                      <p:cBhvr>
-                                        <p:cTn id="14" dur="1" fill="hold">
-                                          <p:stCondLst>
-                                            <p:cond delay="0"/>
-                                          </p:stCondLst>
-                                        </p:cTn>
-                                        <p:tgtEl>
-                                          <p:spTgt spid="3">
-                                            <p:txEl>
-                                              <p:pRg st="1" end="1"/>
-                                            </p:txEl>
-                                          </p:spTgt>
-                                        </p:tgtEl>
-                                        <p:attrNameLst>
-                                          <p:attrName>style.visibility</p:attrName>
-                                        </p:attrNameLst>
-                                      </p:cBhvr>
-                                      <p:to>
-                                        <p:strVal val="visible"/>
-                                      </p:to>
-                                    </p:set>
-                                    <p:animEffect transition="in" filter="fade">
-                                      <p:cBhvr>
-                                        <p:cTn id="15" dur="500"/>
-                                        <p:tgtEl>
-                                          <p:spTgt spid="3">
-                                            <p:txEl>
-                                              <p:pRg st="1" end="1"/>
-                                            </p:txEl>
-                                          </p:spTgt>
-                                        </p:tgtEl>
-                                      </p:cBhvr>
-                                    </p:animEffect>
-                                  </p:childTnLst>
-                                </p:cTn>
-                              </p:par>
-                            </p:childTnLst>
-                          </p:cTn>
-                        </p:par>
-                      </p:childTnLst>
-                    </p:cTn>
-                  </p:par>
-                </p:childTnLst>
-              </p:cTn>
-              <p:prevCondLst>
-                <p:cond evt="onPrev" delay="0">
-                  <p:tgtEl>
-                    <p:sldTgt/>
-                  </p:tgtEl>
-                </p:cond>
-              </p:prevCondLst>
-              <p:nextCondLst>
-                <p:cond evt="onNext" delay="0">
-                  <p:tgtEl>
-                    <p:sldTgt/>
-                  </p:tgtEl>
-                </p:cond>
-              </p:nextCondLst>
-            </p:seq>
-          </p:childTnLst>
-        </p:cTn>
-      </p:par>
-    </p:tnLst>
-    <p:bldLst>
-      <p:bldP spid="2" grpId="0"/>
-    </p:bldLst>
-  </p:timing>
 </p:sld>
 </file>
 
@@ -4693,14 +4643,14 @@
           <p:nvPr>
             <p:extLst>
               <p:ext uri="{D42A27DB-BD31-4B8C-83A1-F6EECF244321}">
-                <p14:modId xmlns:p14="http://schemas.microsoft.com/office/powerpoint/2010/main" val="1977524594"/>
+                <p14:modId xmlns:p14="http://schemas.microsoft.com/office/powerpoint/2010/main" val="763615021"/>
               </p:ext>
             </p:extLst>
           </p:nvPr>
         </p:nvGraphicFramePr>
         <p:xfrm>
-          <a:off x="335665" y="1307940"/>
-          <a:ext cx="4861367" cy="5370062"/>
+          <a:off x="6162674" y="203429"/>
+          <a:ext cx="5693660" cy="6289446"/>
         </p:xfrm>
         <a:graphic>
           <a:graphicData uri="http://schemas.openxmlformats.org/presentationml/2006/ole">
@@ -4736,8 +4686,8 @@
                     </p:blipFill>
                     <p:spPr bwMode="auto">
                       <a:xfrm>
-                        <a:off x="335665" y="1307940"/>
-                        <a:ext cx="4861367" cy="5370062"/>
+                        <a:off x="6162674" y="203429"/>
+                        <a:ext cx="5693660" cy="6289446"/>
                       </a:xfrm>
                       <a:prstGeom prst="rect">
                         <a:avLst/>
@@ -4761,6 +4711,18 @@
   <p:clrMapOvr>
     <a:masterClrMapping/>
   </p:clrMapOvr>
+  <mc:AlternateContent xmlns:mc="http://schemas.openxmlformats.org/markup-compatibility/2006">
+    <mc:Choice xmlns:p159="http://schemas.microsoft.com/office/powerpoint/2015/09/main" Requires="p159">
+      <p:transition xmlns:p14="http://schemas.microsoft.com/office/powerpoint/2010/main" spd="slow" p14:dur="2000">
+        <p159:morph option="byObject"/>
+      </p:transition>
+    </mc:Choice>
+    <mc:Fallback>
+      <p:transition spd="slow">
+        <p:fade/>
+      </p:transition>
+    </mc:Fallback>
+  </mc:AlternateContent>
 </p:sld>
 </file>
 
@@ -5199,14 +5161,14 @@
   <p:clrMapOvr>
     <a:masterClrMapping/>
   </p:clrMapOvr>
-  <mc:AlternateContent xmlns:mc="http://schemas.openxmlformats.org/markup-compatibility/2006" xmlns:p14="http://schemas.microsoft.com/office/powerpoint/2010/main">
-    <mc:Choice Requires="p14">
-      <p:transition spd="med" p14:dur="700">
-        <p:fade/>
+  <mc:AlternateContent xmlns:mc="http://schemas.openxmlformats.org/markup-compatibility/2006">
+    <mc:Choice xmlns:p159="http://schemas.microsoft.com/office/powerpoint/2015/09/main" Requires="p159">
+      <p:transition xmlns:p14="http://schemas.microsoft.com/office/powerpoint/2010/main" spd="slow" p14:dur="2000">
+        <p159:morph option="byObject"/>
       </p:transition>
     </mc:Choice>
-    <mc:Fallback xmlns="">
-      <p:transition spd="med">
+    <mc:Fallback>
+      <p:transition spd="slow">
         <p:fade/>
       </p:transition>
     </mc:Fallback>
@@ -5430,14 +5392,14 @@
           <p:nvPr>
             <p:extLst>
               <p:ext uri="{D42A27DB-BD31-4B8C-83A1-F6EECF244321}">
-                <p14:modId xmlns:p14="http://schemas.microsoft.com/office/powerpoint/2010/main" val="2797170620"/>
+                <p14:modId xmlns:p14="http://schemas.microsoft.com/office/powerpoint/2010/main" val="1916548165"/>
               </p:ext>
             </p:extLst>
           </p:nvPr>
         </p:nvGraphicFramePr>
         <p:xfrm>
-          <a:off x="196298" y="1185777"/>
-          <a:ext cx="7325830" cy="5535698"/>
+          <a:off x="4327848" y="1195198"/>
+          <a:ext cx="7494037" cy="5662802"/>
         </p:xfrm>
         <a:graphic>
           <a:graphicData uri="http://schemas.openxmlformats.org/presentationml/2006/ole">
@@ -5459,13 +5421,7 @@
                       <p:nvPr/>
                     </p:nvPicPr>
                     <p:blipFill>
-                      <a:blip r:embed="rId3">
-                        <a:extLst>
-                          <a:ext uri="{28A0092B-C50C-407E-A947-70E740481C1C}">
-                            <a14:useLocalDpi xmlns:a14="http://schemas.microsoft.com/office/drawing/2010/main" val="0"/>
-                          </a:ext>
-                        </a:extLst>
-                      </a:blip>
+                      <a:blip r:embed="rId3"/>
                       <a:srcRect/>
                       <a:stretch>
                         <a:fillRect/>
@@ -5473,8 +5429,8 @@
                     </p:blipFill>
                     <p:spPr bwMode="auto">
                       <a:xfrm>
-                        <a:off x="196298" y="1185777"/>
-                        <a:ext cx="7325830" cy="5535698"/>
+                        <a:off x="4327848" y="1195198"/>
+                        <a:ext cx="7494037" cy="5662802"/>
                       </a:xfrm>
                       <a:prstGeom prst="rect">
                         <a:avLst/>
@@ -5498,6 +5454,18 @@
   <p:clrMapOvr>
     <a:masterClrMapping/>
   </p:clrMapOvr>
+  <mc:AlternateContent xmlns:mc="http://schemas.openxmlformats.org/markup-compatibility/2006">
+    <mc:Choice xmlns:p159="http://schemas.microsoft.com/office/powerpoint/2015/09/main" Requires="p159">
+      <p:transition xmlns:p14="http://schemas.microsoft.com/office/powerpoint/2010/main" spd="slow" p14:dur="2000">
+        <p159:morph option="byObject"/>
+      </p:transition>
+    </mc:Choice>
+    <mc:Fallback>
+      <p:transition spd="slow">
+        <p:fade/>
+      </p:transition>
+    </mc:Fallback>
+  </mc:AlternateContent>
 </p:sld>
 </file>
 
@@ -5675,6 +5643,18 @@
   <p:clrMapOvr>
     <a:masterClrMapping/>
   </p:clrMapOvr>
+  <mc:AlternateContent xmlns:mc="http://schemas.openxmlformats.org/markup-compatibility/2006">
+    <mc:Choice xmlns:p159="http://schemas.microsoft.com/office/powerpoint/2015/09/main" Requires="p159">
+      <p:transition xmlns:p14="http://schemas.microsoft.com/office/powerpoint/2010/main" spd="slow" p14:dur="2000">
+        <p159:morph option="byObject"/>
+      </p:transition>
+    </mc:Choice>
+    <mc:Fallback>
+      <p:transition spd="slow">
+        <p:fade/>
+      </p:transition>
+    </mc:Fallback>
+  </mc:AlternateContent>
 </p:sld>
 </file>
 
@@ -5889,14 +5869,14 @@
           <p:nvPr>
             <p:extLst>
               <p:ext uri="{D42A27DB-BD31-4B8C-83A1-F6EECF244321}">
-                <p14:modId xmlns:p14="http://schemas.microsoft.com/office/powerpoint/2010/main" val="2840110718"/>
+                <p14:modId xmlns:p14="http://schemas.microsoft.com/office/powerpoint/2010/main" val="3526718739"/>
               </p:ext>
             </p:extLst>
           </p:nvPr>
         </p:nvGraphicFramePr>
         <p:xfrm>
-          <a:off x="8796130" y="-1"/>
-          <a:ext cx="3303795" cy="6609237"/>
+          <a:off x="3862180" y="365125"/>
+          <a:ext cx="7815470" cy="15634836"/>
         </p:xfrm>
         <a:graphic>
           <a:graphicData uri="http://schemas.openxmlformats.org/presentationml/2006/ole">
@@ -5932,8 +5912,8 @@
                     </p:blipFill>
                     <p:spPr bwMode="auto">
                       <a:xfrm>
-                        <a:off x="8796130" y="-1"/>
-                        <a:ext cx="3303795" cy="6609237"/>
+                        <a:off x="3862180" y="365125"/>
+                        <a:ext cx="7815470" cy="15634836"/>
                       </a:xfrm>
                       <a:prstGeom prst="rect">
                         <a:avLst/>
@@ -5957,10 +5937,634 @@
   <p:clrMapOvr>
     <a:masterClrMapping/>
   </p:clrMapOvr>
+  <mc:AlternateContent xmlns:mc="http://schemas.openxmlformats.org/markup-compatibility/2006">
+    <mc:Choice xmlns:p159="http://schemas.microsoft.com/office/powerpoint/2015/09/main" Requires="p159">
+      <p:transition xmlns:p14="http://schemas.microsoft.com/office/powerpoint/2010/main" spd="slow" p14:dur="2000">
+        <p159:morph option="byObject"/>
+      </p:transition>
+    </mc:Choice>
+    <mc:Fallback>
+      <p:transition spd="slow">
+        <p:fade/>
+      </p:transition>
+    </mc:Fallback>
+  </mc:AlternateContent>
 </p:sld>
 </file>
 
 <file path=ppt/slides/slide15.xml><?xml version="1.0" encoding="utf-8"?>
+<p:sld xmlns:a="http://schemas.openxmlformats.org/drawingml/2006/main" xmlns:r="http://schemas.openxmlformats.org/officeDocument/2006/relationships" xmlns:p="http://schemas.openxmlformats.org/presentationml/2006/main">
+  <p:cSld>
+    <p:spTree>
+      <p:nvGrpSpPr>
+        <p:cNvPr id="1" name="">
+          <a:extLst>
+            <a:ext uri="{FF2B5EF4-FFF2-40B4-BE49-F238E27FC236}">
+              <a16:creationId xmlns:a16="http://schemas.microsoft.com/office/drawing/2014/main" id="{045F034C-AB46-E521-1F69-01168F907998}"/>
+            </a:ext>
+          </a:extLst>
+        </p:cNvPr>
+        <p:cNvGrpSpPr/>
+        <p:nvPr/>
+      </p:nvGrpSpPr>
+      <p:grpSpPr>
+        <a:xfrm>
+          <a:off x="0" y="0"/>
+          <a:ext cx="0" cy="0"/>
+          <a:chOff x="0" y="0"/>
+          <a:chExt cx="0" cy="0"/>
+        </a:xfrm>
+      </p:grpSpPr>
+      <p:sp>
+        <p:nvSpPr>
+          <p:cNvPr id="2" name="Titel 1">
+            <a:extLst>
+              <a:ext uri="{FF2B5EF4-FFF2-40B4-BE49-F238E27FC236}">
+                <a16:creationId xmlns:a16="http://schemas.microsoft.com/office/drawing/2014/main" id="{3C1C6CD8-AB3C-FB49-0452-C72BFA2A6135}"/>
+              </a:ext>
+            </a:extLst>
+          </p:cNvPr>
+          <p:cNvSpPr>
+            <a:spLocks noGrp="1"/>
+          </p:cNvSpPr>
+          <p:nvPr>
+            <p:ph type="title"/>
+          </p:nvPr>
+        </p:nvSpPr>
+        <p:spPr/>
+        <p:txBody>
+          <a:bodyPr/>
+          <a:lstStyle/>
+          <a:p>
+            <a:r>
+              <a:rPr lang="nl-BE" dirty="0"/>
+              <a:t>Declaratie</a:t>
+            </a:r>
+          </a:p>
+        </p:txBody>
+      </p:sp>
+      <p:sp>
+        <p:nvSpPr>
+          <p:cNvPr id="3" name="Tijdelijke aanduiding voor inhoud 2">
+            <a:extLst>
+              <a:ext uri="{FF2B5EF4-FFF2-40B4-BE49-F238E27FC236}">
+                <a16:creationId xmlns:a16="http://schemas.microsoft.com/office/drawing/2014/main" id="{9472AD89-F8D7-C1FD-DFDE-055981D8263B}"/>
+              </a:ext>
+            </a:extLst>
+          </p:cNvPr>
+          <p:cNvSpPr>
+            <a:spLocks noGrp="1"/>
+          </p:cNvSpPr>
+          <p:nvPr>
+            <p:ph idx="1"/>
+          </p:nvPr>
+        </p:nvSpPr>
+        <p:spPr/>
+        <p:txBody>
+          <a:bodyPr/>
+          <a:lstStyle/>
+          <a:p>
+            <a:endParaRPr lang="nl-BE" dirty="0"/>
+          </a:p>
+        </p:txBody>
+      </p:sp>
+      <p:sp>
+        <p:nvSpPr>
+          <p:cNvPr id="4" name="Tijdelijke aanduiding voor voettekst 3">
+            <a:extLst>
+              <a:ext uri="{FF2B5EF4-FFF2-40B4-BE49-F238E27FC236}">
+                <a16:creationId xmlns:a16="http://schemas.microsoft.com/office/drawing/2014/main" id="{37B94F26-896D-1C1C-A59D-1EC4C0DE10B6}"/>
+              </a:ext>
+            </a:extLst>
+          </p:cNvPr>
+          <p:cNvSpPr>
+            <a:spLocks noGrp="1"/>
+          </p:cNvSpPr>
+          <p:nvPr>
+            <p:ph type="ftr" sz="quarter" idx="11"/>
+          </p:nvPr>
+        </p:nvSpPr>
+        <p:spPr/>
+        <p:txBody>
+          <a:bodyPr/>
+          <a:lstStyle/>
+          <a:p>
+            <a:r>
+              <a:rPr lang="nl-BE" dirty="0"/>
+              <a:t>Software</a:t>
+            </a:r>
+          </a:p>
+        </p:txBody>
+      </p:sp>
+      <p:sp>
+        <p:nvSpPr>
+          <p:cNvPr id="5" name="Tijdelijke aanduiding voor dianummer 4">
+            <a:extLst>
+              <a:ext uri="{FF2B5EF4-FFF2-40B4-BE49-F238E27FC236}">
+                <a16:creationId xmlns:a16="http://schemas.microsoft.com/office/drawing/2014/main" id="{825629F2-68EA-8C1C-6732-1937BAEB03A4}"/>
+              </a:ext>
+            </a:extLst>
+          </p:cNvPr>
+          <p:cNvSpPr>
+            <a:spLocks noGrp="1"/>
+          </p:cNvSpPr>
+          <p:nvPr>
+            <p:ph type="sldNum" sz="quarter" idx="12"/>
+          </p:nvPr>
+        </p:nvSpPr>
+        <p:spPr/>
+        <p:txBody>
+          <a:bodyPr/>
+          <a:lstStyle/>
+          <a:p>
+            <a:fld id="{CF769C61-EDDB-4958-A626-BA0E0F3C6BBE}" type="slidenum">
+              <a:rPr lang="nl-BE" smtClean="0"/>
+              <a:t>15</a:t>
+            </a:fld>
+            <a:endParaRPr lang="nl-BE"/>
+          </a:p>
+        </p:txBody>
+      </p:sp>
+      <p:sp>
+        <p:nvSpPr>
+          <p:cNvPr id="6" name="Rectangle 2">
+            <a:extLst>
+              <a:ext uri="{FF2B5EF4-FFF2-40B4-BE49-F238E27FC236}">
+                <a16:creationId xmlns:a16="http://schemas.microsoft.com/office/drawing/2014/main" id="{D78ACA1F-B213-0333-97BC-8AC0A99EA581}"/>
+              </a:ext>
+            </a:extLst>
+          </p:cNvPr>
+          <p:cNvSpPr>
+            <a:spLocks noChangeArrowheads="1"/>
+          </p:cNvSpPr>
+          <p:nvPr/>
+        </p:nvSpPr>
+        <p:spPr bwMode="auto">
+          <a:xfrm>
+            <a:off x="8458773" y="-1"/>
+            <a:ext cx="12648627" cy="45719"/>
+          </a:xfrm>
+          <a:prstGeom prst="rect">
+            <a:avLst/>
+          </a:prstGeom>
+          <a:noFill/>
+          <a:ln>
+            <a:noFill/>
+          </a:ln>
+          <a:effectLst/>
+          <a:extLst>
+            <a:ext uri="{909E8E84-426E-40DD-AFC4-6F175D3DCCD1}">
+              <a14:hiddenFill xmlns:a14="http://schemas.microsoft.com/office/drawing/2010/main">
+                <a:solidFill>
+                  <a:schemeClr val="accent1"/>
+                </a:solidFill>
+              </a14:hiddenFill>
+            </a:ext>
+            <a:ext uri="{91240B29-F687-4F45-9708-019B960494DF}">
+              <a14:hiddenLine xmlns:a14="http://schemas.microsoft.com/office/drawing/2010/main" w="9525">
+                <a:solidFill>
+                  <a:schemeClr val="tx1"/>
+                </a:solidFill>
+                <a:miter lim="800000"/>
+                <a:headEnd/>
+                <a:tailEnd/>
+              </a14:hiddenLine>
+            </a:ext>
+            <a:ext uri="{AF507438-7753-43E0-B8FC-AC1667EBCBE1}">
+              <a14:hiddenEffects xmlns:a14="http://schemas.microsoft.com/office/drawing/2010/main">
+                <a:effectLst>
+                  <a:outerShdw dist="35921" dir="2700000" algn="ctr" rotWithShape="0">
+                    <a:schemeClr val="bg2"/>
+                  </a:outerShdw>
+                </a:effectLst>
+              </a14:hiddenEffects>
+            </a:ext>
+          </a:extLst>
+        </p:spPr>
+        <p:txBody>
+          <a:bodyPr vert="horz" wrap="square" lIns="91440" tIns="45720" rIns="91440" bIns="45720" numCol="1" anchor="ctr" anchorCtr="0" compatLnSpc="1">
+            <a:prstTxWarp prst="textNoShape">
+              <a:avLst/>
+            </a:prstTxWarp>
+            <a:spAutoFit/>
+          </a:bodyPr>
+          <a:lstStyle/>
+          <a:p>
+            <a:endParaRPr lang="nl-BE"/>
+          </a:p>
+        </p:txBody>
+      </p:sp>
+      <p:graphicFrame>
+        <p:nvGraphicFramePr>
+          <p:cNvPr id="7" name="Object 6">
+            <a:extLst>
+              <a:ext uri="{FF2B5EF4-FFF2-40B4-BE49-F238E27FC236}">
+                <a16:creationId xmlns:a16="http://schemas.microsoft.com/office/drawing/2014/main" id="{BCA74C68-2CD1-EA89-5183-4417323B6915}"/>
+              </a:ext>
+            </a:extLst>
+          </p:cNvPr>
+          <p:cNvGraphicFramePr>
+            <a:graphicFrameLocks noChangeAspect="1"/>
+          </p:cNvGraphicFramePr>
+          <p:nvPr>
+            <p:extLst>
+              <p:ext uri="{D42A27DB-BD31-4B8C-83A1-F6EECF244321}">
+                <p14:modId xmlns:p14="http://schemas.microsoft.com/office/powerpoint/2010/main" val="1265222314"/>
+              </p:ext>
+            </p:extLst>
+          </p:nvPr>
+        </p:nvGraphicFramePr>
+        <p:xfrm>
+          <a:off x="3733228" y="-5692775"/>
+          <a:ext cx="7815470" cy="15634836"/>
+        </p:xfrm>
+        <a:graphic>
+          <a:graphicData uri="http://schemas.openxmlformats.org/presentationml/2006/ole">
+            <mc:AlternateContent xmlns:mc="http://schemas.openxmlformats.org/markup-compatibility/2006">
+              <mc:Choice xmlns:v="urn:schemas-microsoft-com:vml" Requires="v">
+                <p:oleObj name="Visio" r:id="rId2" imgW="6256119" imgH="12588295" progId="Visio.Drawing.15">
+                  <p:embed/>
+                </p:oleObj>
+              </mc:Choice>
+              <mc:Fallback>
+                <p:oleObj name="Visio" r:id="rId2" imgW="6256119" imgH="12588295" progId="Visio.Drawing.15">
+                  <p:embed/>
+                  <p:pic>
+                    <p:nvPicPr>
+                      <p:cNvPr id="7" name="Object 6">
+                        <a:extLst>
+                          <a:ext uri="{FF2B5EF4-FFF2-40B4-BE49-F238E27FC236}">
+                            <a16:creationId xmlns:a16="http://schemas.microsoft.com/office/drawing/2014/main" id="{5D5A2F70-AFBC-1160-078B-E1565C97FCF5}"/>
+                          </a:ext>
+                        </a:extLst>
+                      </p:cNvPr>
+                      <p:cNvPicPr>
+                        <a:picLocks noChangeAspect="1" noChangeArrowheads="1"/>
+                      </p:cNvPicPr>
+                      <p:nvPr/>
+                    </p:nvPicPr>
+                    <p:blipFill>
+                      <a:blip r:embed="rId3">
+                        <a:extLst>
+                          <a:ext uri="{28A0092B-C50C-407E-A947-70E740481C1C}">
+                            <a14:useLocalDpi xmlns:a14="http://schemas.microsoft.com/office/drawing/2010/main" val="0"/>
+                          </a:ext>
+                        </a:extLst>
+                      </a:blip>
+                      <a:srcRect/>
+                      <a:stretch>
+                        <a:fillRect/>
+                      </a:stretch>
+                    </p:blipFill>
+                    <p:spPr bwMode="auto">
+                      <a:xfrm>
+                        <a:off x="3733228" y="-5692775"/>
+                        <a:ext cx="7815470" cy="15634836"/>
+                      </a:xfrm>
+                      <a:prstGeom prst="rect">
+                        <a:avLst/>
+                      </a:prstGeom>
+                      <a:noFill/>
+                    </p:spPr>
+                  </p:pic>
+                </p:oleObj>
+              </mc:Fallback>
+            </mc:AlternateContent>
+          </a:graphicData>
+        </a:graphic>
+      </p:graphicFrame>
+    </p:spTree>
+    <p:extLst>
+      <p:ext uri="{BB962C8B-B14F-4D97-AF65-F5344CB8AC3E}">
+        <p14:creationId xmlns:p14="http://schemas.microsoft.com/office/powerpoint/2010/main" val="2062104729"/>
+      </p:ext>
+    </p:extLst>
+  </p:cSld>
+  <p:clrMapOvr>
+    <a:masterClrMapping/>
+  </p:clrMapOvr>
+  <mc:AlternateContent xmlns:mc="http://schemas.openxmlformats.org/markup-compatibility/2006">
+    <mc:Choice xmlns:p159="http://schemas.microsoft.com/office/powerpoint/2015/09/main" Requires="p159">
+      <p:transition xmlns:p14="http://schemas.microsoft.com/office/powerpoint/2010/main" spd="slow" p14:dur="2000">
+        <p159:morph option="byObject"/>
+      </p:transition>
+    </mc:Choice>
+    <mc:Fallback>
+      <p:transition spd="slow">
+        <p:fade/>
+      </p:transition>
+    </mc:Fallback>
+  </mc:AlternateContent>
+</p:sld>
+</file>
+
+<file path=ppt/slides/slide16.xml><?xml version="1.0" encoding="utf-8"?>
+<p:sld xmlns:a="http://schemas.openxmlformats.org/drawingml/2006/main" xmlns:r="http://schemas.openxmlformats.org/officeDocument/2006/relationships" xmlns:p="http://schemas.openxmlformats.org/presentationml/2006/main">
+  <p:cSld>
+    <p:spTree>
+      <p:nvGrpSpPr>
+        <p:cNvPr id="1" name="">
+          <a:extLst>
+            <a:ext uri="{FF2B5EF4-FFF2-40B4-BE49-F238E27FC236}">
+              <a16:creationId xmlns:a16="http://schemas.microsoft.com/office/drawing/2014/main" id="{4033EE29-D0B4-F860-05C2-F4337C75D5D2}"/>
+            </a:ext>
+          </a:extLst>
+        </p:cNvPr>
+        <p:cNvGrpSpPr/>
+        <p:nvPr/>
+      </p:nvGrpSpPr>
+      <p:grpSpPr>
+        <a:xfrm>
+          <a:off x="0" y="0"/>
+          <a:ext cx="0" cy="0"/>
+          <a:chOff x="0" y="0"/>
+          <a:chExt cx="0" cy="0"/>
+        </a:xfrm>
+      </p:grpSpPr>
+      <p:sp>
+        <p:nvSpPr>
+          <p:cNvPr id="2" name="Titel 1">
+            <a:extLst>
+              <a:ext uri="{FF2B5EF4-FFF2-40B4-BE49-F238E27FC236}">
+                <a16:creationId xmlns:a16="http://schemas.microsoft.com/office/drawing/2014/main" id="{062385A8-AA1B-1863-B2FA-BD94A15FD66B}"/>
+              </a:ext>
+            </a:extLst>
+          </p:cNvPr>
+          <p:cNvSpPr>
+            <a:spLocks noGrp="1"/>
+          </p:cNvSpPr>
+          <p:nvPr>
+            <p:ph type="title"/>
+          </p:nvPr>
+        </p:nvSpPr>
+        <p:spPr/>
+        <p:txBody>
+          <a:bodyPr/>
+          <a:lstStyle/>
+          <a:p>
+            <a:r>
+              <a:rPr lang="nl-BE" dirty="0"/>
+              <a:t>Declaratie</a:t>
+            </a:r>
+          </a:p>
+        </p:txBody>
+      </p:sp>
+      <p:sp>
+        <p:nvSpPr>
+          <p:cNvPr id="3" name="Tijdelijke aanduiding voor inhoud 2">
+            <a:extLst>
+              <a:ext uri="{FF2B5EF4-FFF2-40B4-BE49-F238E27FC236}">
+                <a16:creationId xmlns:a16="http://schemas.microsoft.com/office/drawing/2014/main" id="{76E66296-0D55-2785-4CFF-C184A43CD984}"/>
+              </a:ext>
+            </a:extLst>
+          </p:cNvPr>
+          <p:cNvSpPr>
+            <a:spLocks noGrp="1"/>
+          </p:cNvSpPr>
+          <p:nvPr>
+            <p:ph idx="1"/>
+          </p:nvPr>
+        </p:nvSpPr>
+        <p:spPr/>
+        <p:txBody>
+          <a:bodyPr/>
+          <a:lstStyle/>
+          <a:p>
+            <a:endParaRPr lang="nl-BE" dirty="0"/>
+          </a:p>
+        </p:txBody>
+      </p:sp>
+      <p:sp>
+        <p:nvSpPr>
+          <p:cNvPr id="4" name="Tijdelijke aanduiding voor voettekst 3">
+            <a:extLst>
+              <a:ext uri="{FF2B5EF4-FFF2-40B4-BE49-F238E27FC236}">
+                <a16:creationId xmlns:a16="http://schemas.microsoft.com/office/drawing/2014/main" id="{60BED42B-4173-31C1-CFA9-A6E30B2BA46B}"/>
+              </a:ext>
+            </a:extLst>
+          </p:cNvPr>
+          <p:cNvSpPr>
+            <a:spLocks noGrp="1"/>
+          </p:cNvSpPr>
+          <p:nvPr>
+            <p:ph type="ftr" sz="quarter" idx="11"/>
+          </p:nvPr>
+        </p:nvSpPr>
+        <p:spPr/>
+        <p:txBody>
+          <a:bodyPr/>
+          <a:lstStyle/>
+          <a:p>
+            <a:r>
+              <a:rPr lang="nl-BE" dirty="0"/>
+              <a:t>Software</a:t>
+            </a:r>
+          </a:p>
+        </p:txBody>
+      </p:sp>
+      <p:sp>
+        <p:nvSpPr>
+          <p:cNvPr id="5" name="Tijdelijke aanduiding voor dianummer 4">
+            <a:extLst>
+              <a:ext uri="{FF2B5EF4-FFF2-40B4-BE49-F238E27FC236}">
+                <a16:creationId xmlns:a16="http://schemas.microsoft.com/office/drawing/2014/main" id="{260F497A-860C-627D-6B74-C3993B0E7614}"/>
+              </a:ext>
+            </a:extLst>
+          </p:cNvPr>
+          <p:cNvSpPr>
+            <a:spLocks noGrp="1"/>
+          </p:cNvSpPr>
+          <p:nvPr>
+            <p:ph type="sldNum" sz="quarter" idx="12"/>
+          </p:nvPr>
+        </p:nvSpPr>
+        <p:spPr/>
+        <p:txBody>
+          <a:bodyPr/>
+          <a:lstStyle/>
+          <a:p>
+            <a:fld id="{CF769C61-EDDB-4958-A626-BA0E0F3C6BBE}" type="slidenum">
+              <a:rPr lang="nl-BE" smtClean="0"/>
+              <a:t>16</a:t>
+            </a:fld>
+            <a:endParaRPr lang="nl-BE"/>
+          </a:p>
+        </p:txBody>
+      </p:sp>
+      <p:sp>
+        <p:nvSpPr>
+          <p:cNvPr id="6" name="Rectangle 2">
+            <a:extLst>
+              <a:ext uri="{FF2B5EF4-FFF2-40B4-BE49-F238E27FC236}">
+                <a16:creationId xmlns:a16="http://schemas.microsoft.com/office/drawing/2014/main" id="{46F820CE-E802-8901-4A49-41F79F8D00FE}"/>
+              </a:ext>
+            </a:extLst>
+          </p:cNvPr>
+          <p:cNvSpPr>
+            <a:spLocks noChangeArrowheads="1"/>
+          </p:cNvSpPr>
+          <p:nvPr/>
+        </p:nvSpPr>
+        <p:spPr bwMode="auto">
+          <a:xfrm>
+            <a:off x="8458773" y="-1"/>
+            <a:ext cx="12648627" cy="45719"/>
+          </a:xfrm>
+          <a:prstGeom prst="rect">
+            <a:avLst/>
+          </a:prstGeom>
+          <a:noFill/>
+          <a:ln>
+            <a:noFill/>
+          </a:ln>
+          <a:effectLst/>
+          <a:extLst>
+            <a:ext uri="{909E8E84-426E-40DD-AFC4-6F175D3DCCD1}">
+              <a14:hiddenFill xmlns:a14="http://schemas.microsoft.com/office/drawing/2010/main">
+                <a:solidFill>
+                  <a:schemeClr val="accent1"/>
+                </a:solidFill>
+              </a14:hiddenFill>
+            </a:ext>
+            <a:ext uri="{91240B29-F687-4F45-9708-019B960494DF}">
+              <a14:hiddenLine xmlns:a14="http://schemas.microsoft.com/office/drawing/2010/main" w="9525">
+                <a:solidFill>
+                  <a:schemeClr val="tx1"/>
+                </a:solidFill>
+                <a:miter lim="800000"/>
+                <a:headEnd/>
+                <a:tailEnd/>
+              </a14:hiddenLine>
+            </a:ext>
+            <a:ext uri="{AF507438-7753-43E0-B8FC-AC1667EBCBE1}">
+              <a14:hiddenEffects xmlns:a14="http://schemas.microsoft.com/office/drawing/2010/main">
+                <a:effectLst>
+                  <a:outerShdw dist="35921" dir="2700000" algn="ctr" rotWithShape="0">
+                    <a:schemeClr val="bg2"/>
+                  </a:outerShdw>
+                </a:effectLst>
+              </a14:hiddenEffects>
+            </a:ext>
+          </a:extLst>
+        </p:spPr>
+        <p:txBody>
+          <a:bodyPr vert="horz" wrap="square" lIns="91440" tIns="45720" rIns="91440" bIns="45720" numCol="1" anchor="ctr" anchorCtr="0" compatLnSpc="1">
+            <a:prstTxWarp prst="textNoShape">
+              <a:avLst/>
+            </a:prstTxWarp>
+            <a:spAutoFit/>
+          </a:bodyPr>
+          <a:lstStyle/>
+          <a:p>
+            <a:endParaRPr lang="nl-BE"/>
+          </a:p>
+        </p:txBody>
+      </p:sp>
+      <p:graphicFrame>
+        <p:nvGraphicFramePr>
+          <p:cNvPr id="7" name="Object 6">
+            <a:extLst>
+              <a:ext uri="{FF2B5EF4-FFF2-40B4-BE49-F238E27FC236}">
+                <a16:creationId xmlns:a16="http://schemas.microsoft.com/office/drawing/2014/main" id="{3466F0D8-8DDA-20D2-B335-355216C93885}"/>
+              </a:ext>
+            </a:extLst>
+          </p:cNvPr>
+          <p:cNvGraphicFramePr>
+            <a:graphicFrameLocks noChangeAspect="1"/>
+          </p:cNvGraphicFramePr>
+          <p:nvPr>
+            <p:extLst>
+              <p:ext uri="{D42A27DB-BD31-4B8C-83A1-F6EECF244321}">
+                <p14:modId xmlns:p14="http://schemas.microsoft.com/office/powerpoint/2010/main" val="3302329515"/>
+              </p:ext>
+            </p:extLst>
+          </p:nvPr>
+        </p:nvGraphicFramePr>
+        <p:xfrm>
+          <a:off x="3733228" y="-9540875"/>
+          <a:ext cx="7815470" cy="15634836"/>
+        </p:xfrm>
+        <a:graphic>
+          <a:graphicData uri="http://schemas.openxmlformats.org/presentationml/2006/ole">
+            <mc:AlternateContent xmlns:mc="http://schemas.openxmlformats.org/markup-compatibility/2006">
+              <mc:Choice xmlns:v="urn:schemas-microsoft-com:vml" Requires="v">
+                <p:oleObj name="Visio" r:id="rId2" imgW="6256119" imgH="12588295" progId="Visio.Drawing.15">
+                  <p:embed/>
+                </p:oleObj>
+              </mc:Choice>
+              <mc:Fallback>
+                <p:oleObj name="Visio" r:id="rId2" imgW="6256119" imgH="12588295" progId="Visio.Drawing.15">
+                  <p:embed/>
+                  <p:pic>
+                    <p:nvPicPr>
+                      <p:cNvPr id="7" name="Object 6">
+                        <a:extLst>
+                          <a:ext uri="{FF2B5EF4-FFF2-40B4-BE49-F238E27FC236}">
+                            <a16:creationId xmlns:a16="http://schemas.microsoft.com/office/drawing/2014/main" id="{BCA74C68-2CD1-EA89-5183-4417323B6915}"/>
+                          </a:ext>
+                        </a:extLst>
+                      </p:cNvPr>
+                      <p:cNvPicPr>
+                        <a:picLocks noChangeAspect="1" noChangeArrowheads="1"/>
+                      </p:cNvPicPr>
+                      <p:nvPr/>
+                    </p:nvPicPr>
+                    <p:blipFill>
+                      <a:blip r:embed="rId3">
+                        <a:extLst>
+                          <a:ext uri="{28A0092B-C50C-407E-A947-70E740481C1C}">
+                            <a14:useLocalDpi xmlns:a14="http://schemas.microsoft.com/office/drawing/2010/main" val="0"/>
+                          </a:ext>
+                        </a:extLst>
+                      </a:blip>
+                      <a:srcRect/>
+                      <a:stretch>
+                        <a:fillRect/>
+                      </a:stretch>
+                    </p:blipFill>
+                    <p:spPr bwMode="auto">
+                      <a:xfrm>
+                        <a:off x="3733228" y="-9540875"/>
+                        <a:ext cx="7815470" cy="15634836"/>
+                      </a:xfrm>
+                      <a:prstGeom prst="rect">
+                        <a:avLst/>
+                      </a:prstGeom>
+                      <a:noFill/>
+                    </p:spPr>
+                  </p:pic>
+                </p:oleObj>
+              </mc:Fallback>
+            </mc:AlternateContent>
+          </a:graphicData>
+        </a:graphic>
+      </p:graphicFrame>
+    </p:spTree>
+    <p:extLst>
+      <p:ext uri="{BB962C8B-B14F-4D97-AF65-F5344CB8AC3E}">
+        <p14:creationId xmlns:p14="http://schemas.microsoft.com/office/powerpoint/2010/main" val="3052977260"/>
+      </p:ext>
+    </p:extLst>
+  </p:cSld>
+  <p:clrMapOvr>
+    <a:masterClrMapping/>
+  </p:clrMapOvr>
+  <mc:AlternateContent xmlns:mc="http://schemas.openxmlformats.org/markup-compatibility/2006">
+    <mc:Choice xmlns:p159="http://schemas.microsoft.com/office/powerpoint/2015/09/main" Requires="p159">
+      <p:transition xmlns:p14="http://schemas.microsoft.com/office/powerpoint/2010/main" spd="slow" p14:dur="2000">
+        <p159:morph option="byObject"/>
+      </p:transition>
+    </mc:Choice>
+    <mc:Fallback>
+      <p:transition spd="slow">
+        <p:fade/>
+      </p:transition>
+    </mc:Fallback>
+  </mc:AlternateContent>
+</p:sld>
+</file>
+
+<file path=ppt/slides/slide17.xml><?xml version="1.0" encoding="utf-8"?>
 <p:sld xmlns:a="http://schemas.openxmlformats.org/drawingml/2006/main" xmlns:r="http://schemas.openxmlformats.org/officeDocument/2006/relationships" xmlns:p="http://schemas.openxmlformats.org/presentationml/2006/main">
   <p:cSld>
     <p:spTree>
@@ -6095,7 +6699,7 @@
           <a:p>
             <a:fld id="{CF769C61-EDDB-4958-A626-BA0E0F3C6BBE}" type="slidenum">
               <a:rPr lang="nl-BE" smtClean="0"/>
-              <a:t>15</a:t>
+              <a:t>17</a:t>
             </a:fld>
             <a:endParaRPr lang="nl-BE"/>
           </a:p>
@@ -6141,10 +6745,22 @@
   <p:clrMapOvr>
     <a:masterClrMapping/>
   </p:clrMapOvr>
+  <mc:AlternateContent xmlns:mc="http://schemas.openxmlformats.org/markup-compatibility/2006">
+    <mc:Choice xmlns:p159="http://schemas.microsoft.com/office/powerpoint/2015/09/main" Requires="p159">
+      <p:transition xmlns:p14="http://schemas.microsoft.com/office/powerpoint/2010/main" spd="slow" p14:dur="2000">
+        <p159:morph option="byObject"/>
+      </p:transition>
+    </mc:Choice>
+    <mc:Fallback>
+      <p:transition spd="slow">
+        <p:fade/>
+      </p:transition>
+    </mc:Fallback>
+  </mc:AlternateContent>
 </p:sld>
 </file>
 
-<file path=ppt/slides/slide16.xml><?xml version="1.0" encoding="utf-8"?>
+<file path=ppt/slides/slide18.xml><?xml version="1.0" encoding="utf-8"?>
 <p:sld xmlns:a="http://schemas.openxmlformats.org/drawingml/2006/main" xmlns:r="http://schemas.openxmlformats.org/officeDocument/2006/relationships" xmlns:p="http://schemas.openxmlformats.org/presentationml/2006/main">
   <p:cSld>
     <p:spTree>
@@ -6265,7 +6881,7 @@
           <a:p>
             <a:fld id="{CF769C61-EDDB-4958-A626-BA0E0F3C6BBE}" type="slidenum">
               <a:rPr lang="nl-BE" smtClean="0"/>
-              <a:t>16</a:t>
+              <a:t>18</a:t>
             </a:fld>
             <a:endParaRPr lang="nl-BE"/>
           </a:p>
@@ -6565,10 +7181,22 @@
   <p:clrMapOvr>
     <a:masterClrMapping/>
   </p:clrMapOvr>
+  <mc:AlternateContent xmlns:mc="http://schemas.openxmlformats.org/markup-compatibility/2006">
+    <mc:Choice xmlns:p159="http://schemas.microsoft.com/office/powerpoint/2015/09/main" Requires="p159">
+      <p:transition xmlns:p14="http://schemas.microsoft.com/office/powerpoint/2010/main" spd="slow" p14:dur="2000">
+        <p159:morph option="byObject"/>
+      </p:transition>
+    </mc:Choice>
+    <mc:Fallback>
+      <p:transition spd="slow">
+        <p:fade/>
+      </p:transition>
+    </mc:Fallback>
+  </mc:AlternateContent>
 </p:sld>
 </file>
 
-<file path=ppt/slides/slide17.xml><?xml version="1.0" encoding="utf-8"?>
+<file path=ppt/slides/slide19.xml><?xml version="1.0" encoding="utf-8"?>
 <p:sld xmlns:a="http://schemas.openxmlformats.org/drawingml/2006/main" xmlns:r="http://schemas.openxmlformats.org/officeDocument/2006/relationships" xmlns:p="http://schemas.openxmlformats.org/presentationml/2006/main">
   <p:cSld>
     <p:spTree>
@@ -6690,7 +7318,7 @@
           <a:p>
             <a:fld id="{CF769C61-EDDB-4958-A626-BA0E0F3C6BBE}" type="slidenum">
               <a:rPr lang="nl-BE" smtClean="0"/>
-              <a:t>17</a:t>
+              <a:t>19</a:t>
             </a:fld>
             <a:endParaRPr lang="nl-BE"/>
           </a:p>
@@ -6922,13 +7550,13 @@
           <p:nvPr>
             <p:extLst>
               <p:ext uri="{D42A27DB-BD31-4B8C-83A1-F6EECF244321}">
-                <p14:modId xmlns:p14="http://schemas.microsoft.com/office/powerpoint/2010/main" val="1493430097"/>
+                <p14:modId xmlns:p14="http://schemas.microsoft.com/office/powerpoint/2010/main" val="4266695560"/>
               </p:ext>
             </p:extLst>
           </p:nvPr>
         </p:nvGraphicFramePr>
         <p:xfrm>
-          <a:off x="2713384" y="2851880"/>
+          <a:off x="2703859" y="379438"/>
           <a:ext cx="9207250" cy="2442376"/>
         </p:xfrm>
         <a:graphic>
@@ -6959,7 +7587,7 @@
                     </p:blipFill>
                     <p:spPr bwMode="auto">
                       <a:xfrm>
-                        <a:off x="2713384" y="2851880"/>
+                        <a:off x="2703859" y="379438"/>
                         <a:ext cx="9207250" cy="2442376"/>
                       </a:xfrm>
                       <a:prstGeom prst="rect">
@@ -6984,10 +7612,370 @@
   <p:clrMapOvr>
     <a:masterClrMapping/>
   </p:clrMapOvr>
+  <mc:AlternateContent xmlns:mc="http://schemas.openxmlformats.org/markup-compatibility/2006">
+    <mc:Choice xmlns:p159="http://schemas.microsoft.com/office/powerpoint/2015/09/main" Requires="p159">
+      <p:transition xmlns:p14="http://schemas.microsoft.com/office/powerpoint/2010/main" spd="slow" p14:dur="2000">
+        <p159:morph option="byObject"/>
+      </p:transition>
+    </mc:Choice>
+    <mc:Fallback>
+      <p:transition spd="slow">
+        <p:fade/>
+      </p:transition>
+    </mc:Fallback>
+  </mc:AlternateContent>
 </p:sld>
 </file>
 
-<file path=ppt/slides/slide18.xml><?xml version="1.0" encoding="utf-8"?>
+<file path=ppt/slides/slide2.xml><?xml version="1.0" encoding="utf-8"?>
+<p:sld xmlns:a="http://schemas.openxmlformats.org/drawingml/2006/main" xmlns:r="http://schemas.openxmlformats.org/officeDocument/2006/relationships" xmlns:p="http://schemas.openxmlformats.org/presentationml/2006/main">
+  <p:cSld>
+    <p:bg>
+      <p:bgPr>
+        <a:solidFill>
+          <a:schemeClr val="bg1"/>
+        </a:solidFill>
+        <a:effectLst/>
+      </p:bgPr>
+    </p:bg>
+    <p:spTree>
+      <p:nvGrpSpPr>
+        <p:cNvPr id="1" name=""/>
+        <p:cNvGrpSpPr/>
+        <p:nvPr/>
+      </p:nvGrpSpPr>
+      <p:grpSpPr>
+        <a:xfrm>
+          <a:off x="0" y="0"/>
+          <a:ext cx="0" cy="0"/>
+          <a:chOff x="0" y="0"/>
+          <a:chExt cx="0" cy="0"/>
+        </a:xfrm>
+      </p:grpSpPr>
+      <p:sp>
+        <p:nvSpPr>
+          <p:cNvPr id="10" name="Rectangle 9">
+            <a:extLst>
+              <a:ext uri="{FF2B5EF4-FFF2-40B4-BE49-F238E27FC236}">
+                <a16:creationId xmlns:a16="http://schemas.microsoft.com/office/drawing/2014/main" id="{9228552E-C8B1-4A80-8448-0787CE0FC704}"/>
+              </a:ext>
+              <a:ext uri="{C183D7F6-B498-43B3-948B-1728B52AA6E4}">
+                <adec:decorative xmlns:adec="http://schemas.microsoft.com/office/drawing/2017/decorative" val="1"/>
+              </a:ext>
+            </a:extLst>
+          </p:cNvPr>
+          <p:cNvSpPr>
+            <a:spLocks noGrp="1" noRot="1" noChangeAspect="1" noMove="1" noResize="1" noEditPoints="1" noAdjustHandles="1" noChangeArrowheads="1" noChangeShapeType="1" noTextEdit="1"/>
+          </p:cNvSpPr>
+          <p:nvPr>
+            <p:extLst>
+              <p:ext uri="{386F3935-93C4-4BCD-93E2-E3B085C9AB24}">
+                <p16:designElem xmlns:p16="http://schemas.microsoft.com/office/powerpoint/2015/main" val="1"/>
+              </p:ext>
+            </p:extLst>
+          </p:nvPr>
+        </p:nvSpPr>
+        <p:spPr>
+          <a:xfrm>
+            <a:off x="0" y="0"/>
+            <a:ext cx="12192000" cy="6858000"/>
+          </a:xfrm>
+          <a:prstGeom prst="rect">
+            <a:avLst/>
+          </a:prstGeom>
+          <a:solidFill>
+            <a:srgbClr val="000000"/>
+          </a:solidFill>
+          <a:ln>
+            <a:noFill/>
+          </a:ln>
+        </p:spPr>
+        <p:style>
+          <a:lnRef idx="2">
+            <a:schemeClr val="accent1">
+              <a:shade val="50000"/>
+            </a:schemeClr>
+          </a:lnRef>
+          <a:fillRef idx="1">
+            <a:schemeClr val="accent1"/>
+          </a:fillRef>
+          <a:effectRef idx="0">
+            <a:schemeClr val="accent1"/>
+          </a:effectRef>
+          <a:fontRef idx="minor">
+            <a:schemeClr val="lt1"/>
+          </a:fontRef>
+        </p:style>
+        <p:txBody>
+          <a:bodyPr rtlCol="0" anchor="ctr"/>
+          <a:lstStyle/>
+          <a:p>
+            <a:pPr algn="ctr"/>
+            <a:endParaRPr lang="nl-BE" noProof="0" dirty="0"/>
+          </a:p>
+        </p:txBody>
+      </p:sp>
+      <p:pic>
+        <p:nvPicPr>
+          <p:cNvPr id="5" name="Afbeelding 4" descr="Afbeelding met wiel, speelgoed, band, Schaalmodel&#10;&#10;Door AI gegenereerde inhoud is mogelijk onjuist.">
+            <a:extLst>
+              <a:ext uri="{FF2B5EF4-FFF2-40B4-BE49-F238E27FC236}">
+                <a16:creationId xmlns:a16="http://schemas.microsoft.com/office/drawing/2014/main" id="{C6F596F5-18C6-0F3E-91BE-CE3BA52E9C55}"/>
+              </a:ext>
+            </a:extLst>
+          </p:cNvPr>
+          <p:cNvPicPr>
+            <a:picLocks noChangeAspect="1"/>
+          </p:cNvPicPr>
+          <p:nvPr/>
+        </p:nvPicPr>
+        <p:blipFill>
+          <a:blip r:embed="rId2">
+            <a:alphaModFix amt="35000"/>
+            <a:extLst>
+              <a:ext uri="{28A0092B-C50C-407E-A947-70E740481C1C}">
+                <a14:useLocalDpi xmlns:a14="http://schemas.microsoft.com/office/drawing/2010/main" val="0"/>
+              </a:ext>
+            </a:extLst>
+          </a:blip>
+          <a:srcRect/>
+          <a:stretch/>
+        </p:blipFill>
+        <p:spPr>
+          <a:xfrm>
+            <a:off x="20" y="10"/>
+            <a:ext cx="12191980" cy="6857990"/>
+          </a:xfrm>
+          <a:prstGeom prst="rect">
+            <a:avLst/>
+          </a:prstGeom>
+        </p:spPr>
+      </p:pic>
+      <p:sp>
+        <p:nvSpPr>
+          <p:cNvPr id="2" name="Titel 1">
+            <a:extLst>
+              <a:ext uri="{FF2B5EF4-FFF2-40B4-BE49-F238E27FC236}">
+                <a16:creationId xmlns:a16="http://schemas.microsoft.com/office/drawing/2014/main" id="{E657426F-BFF0-1572-7573-52D8DBB0BDFC}"/>
+              </a:ext>
+            </a:extLst>
+          </p:cNvPr>
+          <p:cNvSpPr>
+            <a:spLocks noGrp="1"/>
+          </p:cNvSpPr>
+          <p:nvPr>
+            <p:ph type="title"/>
+          </p:nvPr>
+        </p:nvSpPr>
+        <p:spPr>
+          <a:xfrm>
+            <a:off x="838200" y="365125"/>
+            <a:ext cx="10515600" cy="1325563"/>
+          </a:xfrm>
+        </p:spPr>
+        <p:txBody>
+          <a:bodyPr>
+            <a:normAutofit/>
+          </a:bodyPr>
+          <a:lstStyle/>
+          <a:p>
+            <a:r>
+              <a:rPr lang="nl-BE" noProof="0" dirty="0">
+                <a:solidFill>
+                  <a:srgbClr val="FFFFFF"/>
+                </a:solidFill>
+              </a:rPr>
+              <a:t>Inhoud</a:t>
+            </a:r>
+          </a:p>
+        </p:txBody>
+      </p:sp>
+      <p:sp>
+        <p:nvSpPr>
+          <p:cNvPr id="3" name="Tijdelijke aanduiding voor inhoud 2">
+            <a:extLst>
+              <a:ext uri="{FF2B5EF4-FFF2-40B4-BE49-F238E27FC236}">
+                <a16:creationId xmlns:a16="http://schemas.microsoft.com/office/drawing/2014/main" id="{11A7B326-49A2-B512-FDF0-716BEDDABD24}"/>
+              </a:ext>
+            </a:extLst>
+          </p:cNvPr>
+          <p:cNvSpPr>
+            <a:spLocks noGrp="1"/>
+          </p:cNvSpPr>
+          <p:nvPr>
+            <p:ph idx="1"/>
+          </p:nvPr>
+        </p:nvSpPr>
+        <p:spPr>
+          <a:xfrm>
+            <a:off x="838200" y="1825625"/>
+            <a:ext cx="10515600" cy="4351338"/>
+          </a:xfrm>
+        </p:spPr>
+        <p:txBody>
+          <a:bodyPr>
+            <a:normAutofit/>
+          </a:bodyPr>
+          <a:lstStyle/>
+          <a:p>
+            <a:r>
+              <a:rPr lang="nl-BE" noProof="0" dirty="0">
+                <a:solidFill>
+                  <a:srgbClr val="FFFFFF"/>
+                </a:solidFill>
+              </a:rPr>
+              <a:t>Algemene uitleg</a:t>
+            </a:r>
+          </a:p>
+          <a:p>
+            <a:r>
+              <a:rPr lang="nl-BE" noProof="0" dirty="0">
+                <a:solidFill>
+                  <a:srgbClr val="FFFFFF"/>
+                </a:solidFill>
+              </a:rPr>
+              <a:t>Demo</a:t>
+            </a:r>
+          </a:p>
+          <a:p>
+            <a:r>
+              <a:rPr lang="nl-BE" noProof="0" dirty="0">
+                <a:solidFill>
+                  <a:srgbClr val="FFFFFF"/>
+                </a:solidFill>
+              </a:rPr>
+              <a:t>Hardware</a:t>
+            </a:r>
+          </a:p>
+          <a:p>
+            <a:r>
+              <a:rPr lang="nl-BE" noProof="0" dirty="0">
+                <a:solidFill>
+                  <a:srgbClr val="FFFFFF"/>
+                </a:solidFill>
+              </a:rPr>
+              <a:t>Software</a:t>
+            </a:r>
+          </a:p>
+          <a:p>
+            <a:r>
+              <a:rPr lang="nl-BE" noProof="0" dirty="0">
+                <a:solidFill>
+                  <a:srgbClr val="FFFFFF"/>
+                </a:solidFill>
+              </a:rPr>
+              <a:t>Extra</a:t>
+            </a:r>
+          </a:p>
+          <a:p>
+            <a:r>
+              <a:rPr lang="nl-BE" noProof="0" dirty="0">
+                <a:solidFill>
+                  <a:srgbClr val="FFFFFF"/>
+                </a:solidFill>
+              </a:rPr>
+              <a:t>Afsluiter</a:t>
+            </a:r>
+          </a:p>
+          <a:p>
+            <a:endParaRPr lang="nl-BE" noProof="0" dirty="0">
+              <a:solidFill>
+                <a:srgbClr val="FFFFFF"/>
+              </a:solidFill>
+            </a:endParaRPr>
+          </a:p>
+          <a:p>
+            <a:endParaRPr lang="nl-BE" noProof="0" dirty="0">
+              <a:solidFill>
+                <a:srgbClr val="FFFFFF"/>
+              </a:solidFill>
+            </a:endParaRPr>
+          </a:p>
+        </p:txBody>
+      </p:sp>
+      <p:sp>
+        <p:nvSpPr>
+          <p:cNvPr id="7" name="Tijdelijke aanduiding voor dianummer 6">
+            <a:extLst>
+              <a:ext uri="{FF2B5EF4-FFF2-40B4-BE49-F238E27FC236}">
+                <a16:creationId xmlns:a16="http://schemas.microsoft.com/office/drawing/2014/main" id="{22E3C48A-13DA-7D33-CB31-8DA206A087EB}"/>
+              </a:ext>
+            </a:extLst>
+          </p:cNvPr>
+          <p:cNvSpPr>
+            <a:spLocks noGrp="1"/>
+          </p:cNvSpPr>
+          <p:nvPr>
+            <p:ph type="sldNum" sz="quarter" idx="12"/>
+          </p:nvPr>
+        </p:nvSpPr>
+        <p:spPr/>
+        <p:txBody>
+          <a:bodyPr/>
+          <a:lstStyle/>
+          <a:p>
+            <a:fld id="{CF769C61-EDDB-4958-A626-BA0E0F3C6BBE}" type="slidenum">
+              <a:rPr lang="nl-BE" noProof="0" smtClean="0"/>
+              <a:t>2</a:t>
+            </a:fld>
+            <a:endParaRPr lang="nl-BE" noProof="0" dirty="0"/>
+          </a:p>
+        </p:txBody>
+      </p:sp>
+      <p:sp>
+        <p:nvSpPr>
+          <p:cNvPr id="4" name="Tijdelijke aanduiding voor voettekst 3">
+            <a:extLst>
+              <a:ext uri="{FF2B5EF4-FFF2-40B4-BE49-F238E27FC236}">
+                <a16:creationId xmlns:a16="http://schemas.microsoft.com/office/drawing/2014/main" id="{C275525B-AEBF-7F6D-9C7F-0FABFB19558E}"/>
+              </a:ext>
+            </a:extLst>
+          </p:cNvPr>
+          <p:cNvSpPr>
+            <a:spLocks noGrp="1"/>
+          </p:cNvSpPr>
+          <p:nvPr>
+            <p:ph type="ftr" sz="quarter" idx="11"/>
+          </p:nvPr>
+        </p:nvSpPr>
+        <p:spPr/>
+        <p:txBody>
+          <a:bodyPr/>
+          <a:lstStyle/>
+          <a:p>
+            <a:r>
+              <a:rPr lang="nl-BE" noProof="0" dirty="0"/>
+              <a:t>Inhoud</a:t>
+            </a:r>
+          </a:p>
+        </p:txBody>
+      </p:sp>
+    </p:spTree>
+    <p:extLst>
+      <p:ext uri="{BB962C8B-B14F-4D97-AF65-F5344CB8AC3E}">
+        <p14:creationId xmlns:p14="http://schemas.microsoft.com/office/powerpoint/2010/main" val="1157252764"/>
+      </p:ext>
+    </p:extLst>
+  </p:cSld>
+  <p:clrMapOvr>
+    <a:overrideClrMapping bg1="dk1" tx1="lt1" bg2="dk2" tx2="lt2" accent1="accent1" accent2="accent2" accent3="accent3" accent4="accent4" accent5="accent5" accent6="accent6" hlink="hlink" folHlink="folHlink"/>
+  </p:clrMapOvr>
+  <mc:AlternateContent xmlns:mc="http://schemas.openxmlformats.org/markup-compatibility/2006">
+    <mc:Choice xmlns:p159="http://schemas.microsoft.com/office/powerpoint/2015/09/main" Requires="p159">
+      <p:transition xmlns:p14="http://schemas.microsoft.com/office/powerpoint/2010/main" spd="slow" p14:dur="2000">
+        <p159:morph option="byObject"/>
+      </p:transition>
+    </mc:Choice>
+    <mc:Fallback>
+      <p:transition spd="slow">
+        <p:fade/>
+      </p:transition>
+    </mc:Fallback>
+  </mc:AlternateContent>
+</p:sld>
+</file>
+
+<file path=ppt/slides/slide20.xml><?xml version="1.0" encoding="utf-8"?>
 <p:sld xmlns:a="http://schemas.openxmlformats.org/drawingml/2006/main" xmlns:r="http://schemas.openxmlformats.org/officeDocument/2006/relationships" xmlns:p="http://schemas.openxmlformats.org/presentationml/2006/main">
   <p:cSld>
     <p:spTree>
@@ -7108,7 +8096,7 @@
           <a:p>
             <a:fld id="{CF769C61-EDDB-4958-A626-BA0E0F3C6BBE}" type="slidenum">
               <a:rPr lang="nl-BE" smtClean="0"/>
-              <a:t>18</a:t>
+              <a:t>20</a:t>
             </a:fld>
             <a:endParaRPr lang="nl-BE"/>
           </a:p>
@@ -7408,10 +8396,22 @@
   <p:clrMapOvr>
     <a:masterClrMapping/>
   </p:clrMapOvr>
+  <mc:AlternateContent xmlns:mc="http://schemas.openxmlformats.org/markup-compatibility/2006">
+    <mc:Choice xmlns:p159="http://schemas.microsoft.com/office/powerpoint/2015/09/main" Requires="p159">
+      <p:transition xmlns:p14="http://schemas.microsoft.com/office/powerpoint/2010/main" spd="slow" p14:dur="2000">
+        <p159:morph option="byObject"/>
+      </p:transition>
+    </mc:Choice>
+    <mc:Fallback>
+      <p:transition spd="slow">
+        <p:fade/>
+      </p:transition>
+    </mc:Fallback>
+  </mc:AlternateContent>
 </p:sld>
 </file>
 
-<file path=ppt/slides/slide19.xml><?xml version="1.0" encoding="utf-8"?>
+<file path=ppt/slides/slide21.xml><?xml version="1.0" encoding="utf-8"?>
 <p:sld xmlns:a="http://schemas.openxmlformats.org/drawingml/2006/main" xmlns:r="http://schemas.openxmlformats.org/officeDocument/2006/relationships" xmlns:p="http://schemas.openxmlformats.org/presentationml/2006/main">
   <p:cSld>
     <p:bg>
@@ -7703,7 +8703,7 @@
                   <a:spcPts val="600"/>
                 </a:spcAft>
               </a:pPr>
-              <a:t>19</a:t>
+              <a:t>21</a:t>
             </a:fld>
             <a:endParaRPr lang="nl-BE">
               <a:solidFill>
@@ -7753,10 +8753,22 @@
   <p:clrMapOvr>
     <a:overrideClrMapping bg1="dk1" tx1="lt1" bg2="dk2" tx2="lt2" accent1="accent1" accent2="accent2" accent3="accent3" accent4="accent4" accent5="accent5" accent6="accent6" hlink="hlink" folHlink="folHlink"/>
   </p:clrMapOvr>
+  <mc:AlternateContent xmlns:mc="http://schemas.openxmlformats.org/markup-compatibility/2006">
+    <mc:Choice xmlns:p159="http://schemas.microsoft.com/office/powerpoint/2015/09/main" Requires="p159">
+      <p:transition xmlns:p14="http://schemas.microsoft.com/office/powerpoint/2010/main" spd="slow" p14:dur="2000">
+        <p159:morph option="byObject"/>
+      </p:transition>
+    </mc:Choice>
+    <mc:Fallback>
+      <p:transition spd="slow">
+        <p:fade/>
+      </p:transition>
+    </mc:Fallback>
+  </mc:AlternateContent>
 </p:sld>
 </file>
 
-<file path=ppt/slides/slide2.xml><?xml version="1.0" encoding="utf-8"?>
+<file path=ppt/slides/slide22.xml><?xml version="1.0" encoding="utf-8"?>
 <p:sld xmlns:a="http://schemas.openxmlformats.org/drawingml/2006/main" xmlns:r="http://schemas.openxmlformats.org/officeDocument/2006/relationships" xmlns:p="http://schemas.openxmlformats.org/presentationml/2006/main">
   <p:cSld>
     <p:bg>
@@ -7783,7 +8795,7 @@
       </p:grpSpPr>
       <p:sp>
         <p:nvSpPr>
-          <p:cNvPr id="10" name="Rectangle 9">
+          <p:cNvPr id="12" name="Rectangle 11">
             <a:extLst>
               <a:ext uri="{FF2B5EF4-FFF2-40B4-BE49-F238E27FC236}">
                 <a16:creationId xmlns:a16="http://schemas.microsoft.com/office/drawing/2014/main" id="{9228552E-C8B1-4A80-8448-0787CE0FC704}"/>
@@ -7846,10 +8858,10 @@
       </p:sp>
       <p:pic>
         <p:nvPicPr>
-          <p:cNvPr id="5" name="Afbeelding 4" descr="Afbeelding met wiel, speelgoed, band, Schaalmodel&#10;&#10;Door AI gegenereerde inhoud is mogelijk onjuist.">
-            <a:extLst>
-              <a:ext uri="{FF2B5EF4-FFF2-40B4-BE49-F238E27FC236}">
-                <a16:creationId xmlns:a16="http://schemas.microsoft.com/office/drawing/2014/main" id="{C6F596F5-18C6-0F3E-91BE-CE3BA52E9C55}"/>
+          <p:cNvPr id="7" name="Afbeelding 6" descr="Afbeelding met wiel, speelgoed, band, Schaalmodel&#10;&#10;Door AI gegenereerde inhoud is mogelijk onjuist.">
+            <a:extLst>
+              <a:ext uri="{FF2B5EF4-FFF2-40B4-BE49-F238E27FC236}">
+                <a16:creationId xmlns:a16="http://schemas.microsoft.com/office/drawing/2014/main" id="{2FCAF7F1-58E8-A9D6-4857-4F4F68856BC6}"/>
               </a:ext>
             </a:extLst>
           </p:cNvPr>
@@ -7859,7 +8871,7 @@
           <p:nvPr/>
         </p:nvPicPr>
         <p:blipFill>
-          <a:blip r:embed="rId3">
+          <a:blip r:embed="rId2">
             <a:alphaModFix amt="35000"/>
             <a:extLst>
               <a:ext uri="{28A0092B-C50C-407E-A947-70E740481C1C}">
@@ -7868,7 +8880,9 @@
             </a:extLst>
           </a:blip>
           <a:srcRect/>
-          <a:stretch/>
+          <a:stretch>
+            <a:fillRect/>
+          </a:stretch>
         </p:blipFill>
         <p:spPr>
           <a:xfrm>
@@ -7885,7 +8899,7 @@
           <p:cNvPr id="2" name="Titel 1">
             <a:extLst>
               <a:ext uri="{FF2B5EF4-FFF2-40B4-BE49-F238E27FC236}">
-                <a16:creationId xmlns:a16="http://schemas.microsoft.com/office/drawing/2014/main" id="{E657426F-BFF0-1572-7573-52D8DBB0BDFC}"/>
+                <a16:creationId xmlns:a16="http://schemas.microsoft.com/office/drawing/2014/main" id="{B1E09D67-DBE7-8B54-8C1F-E9D9CA3D84BE}"/>
               </a:ext>
             </a:extLst>
           </p:cNvPr>
@@ -7914,7 +8928,7 @@
                   <a:srgbClr val="FFFFFF"/>
                 </a:solidFill>
               </a:rPr>
-              <a:t>Inhoud</a:t>
+              <a:t>Website</a:t>
             </a:r>
           </a:p>
         </p:txBody>
@@ -7924,7 +8938,7 @@
           <p:cNvPr id="3" name="Tijdelijke aanduiding voor inhoud 2">
             <a:extLst>
               <a:ext uri="{FF2B5EF4-FFF2-40B4-BE49-F238E27FC236}">
-                <a16:creationId xmlns:a16="http://schemas.microsoft.com/office/drawing/2014/main" id="{11A7B326-49A2-B512-FDF0-716BEDDABD24}"/>
+                <a16:creationId xmlns:a16="http://schemas.microsoft.com/office/drawing/2014/main" id="{AF85832B-89D0-1109-9775-C6272C565C70}"/>
               </a:ext>
             </a:extLst>
           </p:cNvPr>
@@ -7953,17 +8967,21 @@
                   <a:srgbClr val="FFFFFF"/>
                 </a:solidFill>
               </a:rPr>
-              <a:t>Algemene uitleg</a:t>
-            </a:r>
-          </a:p>
-          <a:p>
+              <a:t>Waarom?</a:t>
+            </a:r>
+          </a:p>
+          <a:p>
+            <a:pPr lvl="1">
+              <a:buFont typeface="Courier New" panose="02070309020205020404" pitchFamily="49" charset="0"/>
+              <a:buChar char="o"/>
+            </a:pPr>
             <a:r>
               <a:rPr lang="nl-BE" noProof="0" dirty="0">
                 <a:solidFill>
                   <a:srgbClr val="FFFFFF"/>
                 </a:solidFill>
               </a:rPr>
-              <a:t>Demo</a:t>
+              <a:t>Uitleg geven over robot</a:t>
             </a:r>
           </a:p>
           <a:p>
@@ -7973,19 +8991,73 @@
                   <a:srgbClr val="FFFFFF"/>
                 </a:solidFill>
               </a:rPr>
-              <a:t>Hardware</a:t>
-            </a:r>
-          </a:p>
-          <a:p>
+              <a:t>Programmeertaal</a:t>
+            </a:r>
+          </a:p>
+          <a:p>
+            <a:pPr lvl="1">
+              <a:buFont typeface="Courier New" panose="02070309020205020404" pitchFamily="49" charset="0"/>
+              <a:buChar char="o"/>
+            </a:pPr>
             <a:r>
               <a:rPr lang="nl-BE" noProof="0" dirty="0">
                 <a:solidFill>
                   <a:srgbClr val="FFFFFF"/>
                 </a:solidFill>
               </a:rPr>
-              <a:t>Software</a:t>
-            </a:r>
-          </a:p>
+              <a:t>HTML</a:t>
+            </a:r>
+          </a:p>
+          <a:p>
+            <a:pPr lvl="1">
+              <a:buFont typeface="Courier New" panose="02070309020205020404" pitchFamily="49" charset="0"/>
+              <a:buChar char="o"/>
+            </a:pPr>
+            <a:r>
+              <a:rPr lang="nl-BE" noProof="0" dirty="0">
+                <a:solidFill>
+                  <a:srgbClr val="FFFFFF"/>
+                </a:solidFill>
+              </a:rPr>
+              <a:t>CSS</a:t>
+            </a:r>
+          </a:p>
+          <a:p>
+            <a:endParaRPr lang="nl-BE" noProof="0" dirty="0">
+              <a:solidFill>
+                <a:srgbClr val="FFFFFF"/>
+              </a:solidFill>
+            </a:endParaRPr>
+          </a:p>
+        </p:txBody>
+      </p:sp>
+      <p:sp>
+        <p:nvSpPr>
+          <p:cNvPr id="4" name="Tijdelijke aanduiding voor voettekst 3">
+            <a:extLst>
+              <a:ext uri="{FF2B5EF4-FFF2-40B4-BE49-F238E27FC236}">
+                <a16:creationId xmlns:a16="http://schemas.microsoft.com/office/drawing/2014/main" id="{ED3A6253-2723-0083-B389-553B856DE705}"/>
+              </a:ext>
+            </a:extLst>
+          </p:cNvPr>
+          <p:cNvSpPr>
+            <a:spLocks noGrp="1"/>
+          </p:cNvSpPr>
+          <p:nvPr>
+            <p:ph type="ftr" sz="quarter" idx="11"/>
+          </p:nvPr>
+        </p:nvSpPr>
+        <p:spPr>
+          <a:xfrm>
+            <a:off x="4038600" y="6356350"/>
+            <a:ext cx="4114800" cy="365125"/>
+          </a:xfrm>
+        </p:spPr>
+        <p:txBody>
+          <a:bodyPr>
+            <a:normAutofit/>
+          </a:bodyPr>
+          <a:lstStyle/>
           <a:p>
             <a:r>
               <a:rPr lang="nl-BE" noProof="0" dirty="0">
@@ -7996,125 +9068,424 @@
               <a:t>Extra</a:t>
             </a:r>
           </a:p>
-          <a:p>
-            <a:r>
-              <a:rPr lang="nl-BE" noProof="0" dirty="0">
+        </p:txBody>
+      </p:sp>
+      <p:sp>
+        <p:nvSpPr>
+          <p:cNvPr id="5" name="Tijdelijke aanduiding voor dianummer 4">
+            <a:extLst>
+              <a:ext uri="{FF2B5EF4-FFF2-40B4-BE49-F238E27FC236}">
+                <a16:creationId xmlns:a16="http://schemas.microsoft.com/office/drawing/2014/main" id="{2E5275C4-923E-0A92-983C-6D00DE4E4ECF}"/>
+              </a:ext>
+            </a:extLst>
+          </p:cNvPr>
+          <p:cNvSpPr>
+            <a:spLocks noGrp="1"/>
+          </p:cNvSpPr>
+          <p:nvPr>
+            <p:ph type="sldNum" sz="quarter" idx="12"/>
+          </p:nvPr>
+        </p:nvSpPr>
+        <p:spPr>
+          <a:xfrm>
+            <a:off x="8610600" y="6356350"/>
+            <a:ext cx="2743200" cy="365125"/>
+          </a:xfrm>
+        </p:spPr>
+        <p:txBody>
+          <a:bodyPr>
+            <a:normAutofit/>
+          </a:bodyPr>
+          <a:lstStyle/>
+          <a:p>
+            <a:pPr>
+              <a:spcAft>
+                <a:spcPts val="600"/>
+              </a:spcAft>
+            </a:pPr>
+            <a:fld id="{CF769C61-EDDB-4958-A626-BA0E0F3C6BBE}" type="slidenum">
+              <a:rPr lang="nl-BE" noProof="0">
                 <a:solidFill>
                   <a:srgbClr val="FFFFFF"/>
                 </a:solidFill>
               </a:rPr>
-              <a:t>Afsluiter</a:t>
-            </a:r>
-          </a:p>
-          <a:p>
+              <a:pPr>
+                <a:spcAft>
+                  <a:spcPts val="600"/>
+                </a:spcAft>
+              </a:pPr>
+              <a:t>22</a:t>
+            </a:fld>
             <a:endParaRPr lang="nl-BE" noProof="0" dirty="0">
               <a:solidFill>
                 <a:srgbClr val="FFFFFF"/>
               </a:solidFill>
             </a:endParaRPr>
           </a:p>
-          <a:p>
-            <a:endParaRPr lang="nl-BE" noProof="0" dirty="0">
-              <a:solidFill>
-                <a:srgbClr val="FFFFFF"/>
-              </a:solidFill>
-            </a:endParaRPr>
-          </a:p>
-        </p:txBody>
-      </p:sp>
-      <p:sp>
-        <p:nvSpPr>
-          <p:cNvPr id="7" name="Tijdelijke aanduiding voor dianummer 6">
-            <a:extLst>
-              <a:ext uri="{FF2B5EF4-FFF2-40B4-BE49-F238E27FC236}">
-                <a16:creationId xmlns:a16="http://schemas.microsoft.com/office/drawing/2014/main" id="{22E3C48A-13DA-7D33-CB31-8DA206A087EB}"/>
-              </a:ext>
-            </a:extLst>
-          </p:cNvPr>
-          <p:cNvSpPr>
-            <a:spLocks noGrp="1"/>
-          </p:cNvSpPr>
-          <p:nvPr>
-            <p:ph type="sldNum" sz="quarter" idx="12"/>
-          </p:nvPr>
-        </p:nvSpPr>
-        <p:spPr/>
-        <p:txBody>
-          <a:bodyPr/>
-          <a:lstStyle/>
-          <a:p>
-            <a:fld id="{CF769C61-EDDB-4958-A626-BA0E0F3C6BBE}" type="slidenum">
-              <a:rPr lang="nl-BE" noProof="0" smtClean="0"/>
-              <a:t>2</a:t>
-            </a:fld>
-            <a:endParaRPr lang="nl-BE" noProof="0" dirty="0"/>
-          </a:p>
-        </p:txBody>
-      </p:sp>
-      <p:sp>
-        <p:nvSpPr>
-          <p:cNvPr id="4" name="Tijdelijke aanduiding voor voettekst 3">
-            <a:extLst>
-              <a:ext uri="{FF2B5EF4-FFF2-40B4-BE49-F238E27FC236}">
-                <a16:creationId xmlns:a16="http://schemas.microsoft.com/office/drawing/2014/main" id="{C275525B-AEBF-7F6D-9C7F-0FABFB19558E}"/>
-              </a:ext>
-            </a:extLst>
-          </p:cNvPr>
-          <p:cNvSpPr>
-            <a:spLocks noGrp="1"/>
-          </p:cNvSpPr>
-          <p:nvPr>
-            <p:ph type="ftr" sz="quarter" idx="11"/>
-          </p:nvPr>
-        </p:nvSpPr>
-        <p:spPr/>
-        <p:txBody>
-          <a:bodyPr/>
-          <a:lstStyle/>
-          <a:p>
-            <a:r>
-              <a:rPr lang="nl-BE" noProof="0" dirty="0"/>
-              <a:t>Inhoud</a:t>
-            </a:r>
-          </a:p>
         </p:txBody>
       </p:sp>
     </p:spTree>
     <p:extLst>
       <p:ext uri="{BB962C8B-B14F-4D97-AF65-F5344CB8AC3E}">
-        <p14:creationId xmlns:p14="http://schemas.microsoft.com/office/powerpoint/2010/main" val="1157252764"/>
+        <p14:creationId xmlns:p14="http://schemas.microsoft.com/office/powerpoint/2010/main" val="3898959155"/>
       </p:ext>
     </p:extLst>
   </p:cSld>
   <p:clrMapOvr>
     <a:overrideClrMapping bg1="dk1" tx1="lt1" bg2="dk2" tx2="lt2" accent1="accent1" accent2="accent2" accent3="accent3" accent4="accent4" accent5="accent5" accent6="accent6" hlink="hlink" folHlink="folHlink"/>
   </p:clrMapOvr>
-  <mc:AlternateContent xmlns:mc="http://schemas.openxmlformats.org/markup-compatibility/2006" xmlns:p14="http://schemas.microsoft.com/office/powerpoint/2010/main">
-    <mc:Choice Requires="p14">
-      <p:transition spd="med" p14:dur="700">
-        <p:fade/>
-        <p:sndAc>
-          <p:stSnd>
-            <p:snd r:embed="rId2" name="click.wav"/>
-          </p:stSnd>
-        </p:sndAc>
+  <mc:AlternateContent xmlns:mc="http://schemas.openxmlformats.org/markup-compatibility/2006">
+    <mc:Choice xmlns:p159="http://schemas.microsoft.com/office/powerpoint/2015/09/main" Requires="p159">
+      <p:transition xmlns:p14="http://schemas.microsoft.com/office/powerpoint/2010/main" spd="slow" p14:dur="2000">
+        <p159:morph option="byObject"/>
       </p:transition>
     </mc:Choice>
-    <mc:Fallback xmlns="">
-      <p:transition spd="med">
+    <mc:Fallback>
+      <p:transition spd="slow">
         <p:fade/>
-        <p:sndAc>
-          <p:stSnd>
-            <p:snd r:embed="rId4" name="click.wav"/>
-          </p:stSnd>
-        </p:sndAc>
       </p:transition>
     </mc:Fallback>
   </mc:AlternateContent>
 </p:sld>
 </file>
 
-<file path=ppt/slides/slide20.xml><?xml version="1.0" encoding="utf-8"?>
+<file path=ppt/slides/slide23.xml><?xml version="1.0" encoding="utf-8"?>
+<p:sld xmlns:a="http://schemas.openxmlformats.org/drawingml/2006/main" xmlns:r="http://schemas.openxmlformats.org/officeDocument/2006/relationships" xmlns:p="http://schemas.openxmlformats.org/presentationml/2006/main">
+  <p:cSld>
+    <p:bg>
+      <p:bgPr>
+        <a:solidFill>
+          <a:srgbClr val="000000"/>
+        </a:solidFill>
+        <a:effectLst/>
+      </p:bgPr>
+    </p:bg>
+    <p:spTree>
+      <p:nvGrpSpPr>
+        <p:cNvPr id="1" name=""/>
+        <p:cNvGrpSpPr/>
+        <p:nvPr/>
+      </p:nvGrpSpPr>
+      <p:grpSpPr>
+        <a:xfrm>
+          <a:off x="0" y="0"/>
+          <a:ext cx="0" cy="0"/>
+          <a:chOff x="0" y="0"/>
+          <a:chExt cx="0" cy="0"/>
+        </a:xfrm>
+      </p:grpSpPr>
+      <p:sp>
+        <p:nvSpPr>
+          <p:cNvPr id="12" name="Rectangle 11">
+            <a:extLst>
+              <a:ext uri="{FF2B5EF4-FFF2-40B4-BE49-F238E27FC236}">
+                <a16:creationId xmlns:a16="http://schemas.microsoft.com/office/drawing/2014/main" id="{71B2258F-86CA-4D4D-8270-BC05FCDEBFB3}"/>
+              </a:ext>
+              <a:ext uri="{C183D7F6-B498-43B3-948B-1728B52AA6E4}">
+                <adec:decorative xmlns:adec="http://schemas.microsoft.com/office/drawing/2017/decorative" val="1"/>
+              </a:ext>
+            </a:extLst>
+          </p:cNvPr>
+          <p:cNvSpPr>
+            <a:spLocks noGrp="1" noRot="1" noChangeAspect="1" noMove="1" noResize="1" noEditPoints="1" noAdjustHandles="1" noChangeArrowheads="1" noChangeShapeType="1" noTextEdit="1"/>
+          </p:cNvSpPr>
+          <p:nvPr>
+            <p:extLst>
+              <p:ext uri="{386F3935-93C4-4BCD-93E2-E3B085C9AB24}">
+                <p16:designElem xmlns:p16="http://schemas.microsoft.com/office/powerpoint/2015/main" val="1"/>
+              </p:ext>
+            </p:extLst>
+          </p:nvPr>
+        </p:nvSpPr>
+        <p:spPr>
+          <a:xfrm>
+            <a:off x="0" y="0"/>
+            <a:ext cx="12192000" cy="6857999"/>
+          </a:xfrm>
+          <a:prstGeom prst="rect">
+            <a:avLst/>
+          </a:prstGeom>
+          <a:solidFill>
+            <a:srgbClr val="000000"/>
+          </a:solidFill>
+          <a:ln>
+            <a:noFill/>
+          </a:ln>
+        </p:spPr>
+        <p:style>
+          <a:lnRef idx="2">
+            <a:schemeClr val="accent1">
+              <a:shade val="50000"/>
+            </a:schemeClr>
+          </a:lnRef>
+          <a:fillRef idx="1">
+            <a:schemeClr val="accent1"/>
+          </a:fillRef>
+          <a:effectRef idx="0">
+            <a:schemeClr val="accent1"/>
+          </a:effectRef>
+          <a:fontRef idx="minor">
+            <a:schemeClr val="lt1"/>
+          </a:fontRef>
+        </p:style>
+        <p:txBody>
+          <a:bodyPr rtlCol="0" anchor="ctr"/>
+          <a:lstStyle/>
+          <a:p>
+            <a:pPr algn="ctr"/>
+            <a:endParaRPr lang="nl-BE" noProof="0" dirty="0"/>
+          </a:p>
+        </p:txBody>
+      </p:sp>
+      <p:pic>
+        <p:nvPicPr>
+          <p:cNvPr id="7" name="Afbeelding 6" descr="Afbeelding met wiel, speelgoed, band, Schaalmodel">
+            <a:extLst>
+              <a:ext uri="{FF2B5EF4-FFF2-40B4-BE49-F238E27FC236}">
+                <a16:creationId xmlns:a16="http://schemas.microsoft.com/office/drawing/2014/main" id="{D5E9569F-6545-7911-8A56-79FBAA6E6A99}"/>
+              </a:ext>
+            </a:extLst>
+          </p:cNvPr>
+          <p:cNvPicPr>
+            <a:picLocks noChangeAspect="1"/>
+          </p:cNvPicPr>
+          <p:nvPr/>
+        </p:nvPicPr>
+        <p:blipFill>
+          <a:blip r:embed="rId2">
+            <a:alphaModFix amt="50000"/>
+            <a:extLst>
+              <a:ext uri="{28A0092B-C50C-407E-A947-70E740481C1C}">
+                <a14:useLocalDpi xmlns:a14="http://schemas.microsoft.com/office/drawing/2010/main" val="0"/>
+              </a:ext>
+            </a:extLst>
+          </a:blip>
+          <a:srcRect/>
+          <a:stretch>
+            <a:fillRect/>
+          </a:stretch>
+        </p:blipFill>
+        <p:spPr>
+          <a:xfrm>
+            <a:off x="20" y="1"/>
+            <a:ext cx="12191980" cy="6857999"/>
+          </a:xfrm>
+          <a:prstGeom prst="rect">
+            <a:avLst/>
+          </a:prstGeom>
+        </p:spPr>
+      </p:pic>
+      <p:sp>
+        <p:nvSpPr>
+          <p:cNvPr id="2" name="Titel 1">
+            <a:extLst>
+              <a:ext uri="{FF2B5EF4-FFF2-40B4-BE49-F238E27FC236}">
+                <a16:creationId xmlns:a16="http://schemas.microsoft.com/office/drawing/2014/main" id="{8B86BA1F-360B-8053-5AE0-6C35A24D1511}"/>
+              </a:ext>
+            </a:extLst>
+          </p:cNvPr>
+          <p:cNvSpPr>
+            <a:spLocks noGrp="1"/>
+          </p:cNvSpPr>
+          <p:nvPr>
+            <p:ph type="title"/>
+          </p:nvPr>
+        </p:nvSpPr>
+        <p:spPr>
+          <a:xfrm>
+            <a:off x="1524000" y="1122362"/>
+            <a:ext cx="9144000" cy="2900518"/>
+          </a:xfrm>
+        </p:spPr>
+        <p:txBody>
+          <a:bodyPr vert="horz" lIns="91440" tIns="45720" rIns="91440" bIns="45720" rtlCol="0" anchor="b">
+            <a:normAutofit/>
+          </a:bodyPr>
+          <a:lstStyle/>
+          <a:p>
+            <a:pPr algn="ctr"/>
+            <a:r>
+              <a:rPr lang="nl-BE" sz="6000" noProof="0" dirty="0">
+                <a:solidFill>
+                  <a:srgbClr val="FFFFFF"/>
+                </a:solidFill>
+              </a:rPr>
+              <a:t>Einde</a:t>
+            </a:r>
+          </a:p>
+        </p:txBody>
+      </p:sp>
+      <p:sp>
+        <p:nvSpPr>
+          <p:cNvPr id="3" name="Tijdelijke aanduiding voor inhoud 2">
+            <a:extLst>
+              <a:ext uri="{FF2B5EF4-FFF2-40B4-BE49-F238E27FC236}">
+                <a16:creationId xmlns:a16="http://schemas.microsoft.com/office/drawing/2014/main" id="{38785E8D-D7B0-5680-9F28-0D7E13AC86E4}"/>
+              </a:ext>
+            </a:extLst>
+          </p:cNvPr>
+          <p:cNvSpPr>
+            <a:spLocks noGrp="1"/>
+          </p:cNvSpPr>
+          <p:nvPr>
+            <p:ph idx="1"/>
+          </p:nvPr>
+        </p:nvSpPr>
+        <p:spPr>
+          <a:xfrm>
+            <a:off x="1524000" y="4159404"/>
+            <a:ext cx="9144000" cy="1098395"/>
+          </a:xfrm>
+        </p:spPr>
+        <p:txBody>
+          <a:bodyPr vert="horz" lIns="91440" tIns="45720" rIns="91440" bIns="45720" rtlCol="0">
+            <a:normAutofit/>
+          </a:bodyPr>
+          <a:lstStyle/>
+          <a:p>
+            <a:pPr marL="0" indent="0" algn="ctr">
+              <a:buNone/>
+            </a:pPr>
+            <a:r>
+              <a:rPr lang="nl-BE" sz="2400" noProof="0" dirty="0">
+                <a:solidFill>
+                  <a:srgbClr val="FFFFFF"/>
+                </a:solidFill>
+              </a:rPr>
+              <a:t>Zijn er nog vragen?</a:t>
+            </a:r>
+          </a:p>
+        </p:txBody>
+      </p:sp>
+      <p:sp>
+        <p:nvSpPr>
+          <p:cNvPr id="4" name="Tijdelijke aanduiding voor voettekst 3">
+            <a:extLst>
+              <a:ext uri="{FF2B5EF4-FFF2-40B4-BE49-F238E27FC236}">
+                <a16:creationId xmlns:a16="http://schemas.microsoft.com/office/drawing/2014/main" id="{CE5F77B0-7490-9193-423E-DE9CF91AF79D}"/>
+              </a:ext>
+            </a:extLst>
+          </p:cNvPr>
+          <p:cNvSpPr>
+            <a:spLocks noGrp="1"/>
+          </p:cNvSpPr>
+          <p:nvPr>
+            <p:ph type="ftr" sz="quarter" idx="11"/>
+          </p:nvPr>
+        </p:nvSpPr>
+        <p:spPr>
+          <a:xfrm>
+            <a:off x="4038600" y="6356350"/>
+            <a:ext cx="4114800" cy="365125"/>
+          </a:xfrm>
+        </p:spPr>
+        <p:txBody>
+          <a:bodyPr vert="horz" lIns="91440" tIns="45720" rIns="91440" bIns="45720" rtlCol="0" anchor="ctr">
+            <a:normAutofit/>
+          </a:bodyPr>
+          <a:lstStyle/>
+          <a:p>
+            <a:pPr>
+              <a:defRPr/>
+            </a:pPr>
+            <a:r>
+              <a:rPr lang="nl-BE" kern="1200" noProof="0" dirty="0">
+                <a:solidFill>
+                  <a:srgbClr val="FFFFFF"/>
+                </a:solidFill>
+                <a:latin typeface="Calibri" panose="020F0502020204030204"/>
+                <a:ea typeface="+mn-ea"/>
+                <a:cs typeface="+mn-cs"/>
+              </a:rPr>
+              <a:t>Afsluiter</a:t>
+            </a:r>
+          </a:p>
+        </p:txBody>
+      </p:sp>
+      <p:sp>
+        <p:nvSpPr>
+          <p:cNvPr id="5" name="Tijdelijke aanduiding voor dianummer 4">
+            <a:extLst>
+              <a:ext uri="{FF2B5EF4-FFF2-40B4-BE49-F238E27FC236}">
+                <a16:creationId xmlns:a16="http://schemas.microsoft.com/office/drawing/2014/main" id="{6858B3D6-4257-82F2-B062-FC49355323F5}"/>
+              </a:ext>
+            </a:extLst>
+          </p:cNvPr>
+          <p:cNvSpPr>
+            <a:spLocks noGrp="1"/>
+          </p:cNvSpPr>
+          <p:nvPr>
+            <p:ph type="sldNum" sz="quarter" idx="12"/>
+          </p:nvPr>
+        </p:nvSpPr>
+        <p:spPr>
+          <a:xfrm>
+            <a:off x="8610600" y="6356350"/>
+            <a:ext cx="2743200" cy="365125"/>
+          </a:xfrm>
+        </p:spPr>
+        <p:txBody>
+          <a:bodyPr vert="horz" lIns="91440" tIns="45720" rIns="91440" bIns="45720" rtlCol="0" anchor="ctr">
+            <a:normAutofit/>
+          </a:bodyPr>
+          <a:lstStyle/>
+          <a:p>
+            <a:pPr>
+              <a:spcAft>
+                <a:spcPts val="600"/>
+              </a:spcAft>
+              <a:defRPr/>
+            </a:pPr>
+            <a:fld id="{CF769C61-EDDB-4958-A626-BA0E0F3C6BBE}" type="slidenum">
+              <a:rPr lang="nl-BE" noProof="0" smtClean="0">
+                <a:solidFill>
+                  <a:srgbClr val="FFFFFF"/>
+                </a:solidFill>
+                <a:latin typeface="Calibri" panose="020F0502020204030204"/>
+              </a:rPr>
+              <a:pPr>
+                <a:spcAft>
+                  <a:spcPts val="600"/>
+                </a:spcAft>
+                <a:defRPr/>
+              </a:pPr>
+              <a:t>23</a:t>
+            </a:fld>
+            <a:endParaRPr lang="nl-BE" noProof="0" dirty="0">
+              <a:solidFill>
+                <a:srgbClr val="FFFFFF"/>
+              </a:solidFill>
+              <a:latin typeface="Calibri" panose="020F0502020204030204"/>
+            </a:endParaRPr>
+          </a:p>
+        </p:txBody>
+      </p:sp>
+    </p:spTree>
+    <p:extLst>
+      <p:ext uri="{BB962C8B-B14F-4D97-AF65-F5344CB8AC3E}">
+        <p14:creationId xmlns:p14="http://schemas.microsoft.com/office/powerpoint/2010/main" val="1322337779"/>
+      </p:ext>
+    </p:extLst>
+  </p:cSld>
+  <p:clrMapOvr>
+    <a:overrideClrMapping bg1="dk1" tx1="lt1" bg2="dk2" tx2="lt2" accent1="accent1" accent2="accent2" accent3="accent3" accent4="accent4" accent5="accent5" accent6="accent6" hlink="hlink" folHlink="folHlink"/>
+  </p:clrMapOvr>
+  <mc:AlternateContent xmlns:mc="http://schemas.openxmlformats.org/markup-compatibility/2006">
+    <mc:Choice xmlns:p159="http://schemas.microsoft.com/office/powerpoint/2015/09/main" Requires="p159">
+      <p:transition xmlns:p14="http://schemas.microsoft.com/office/powerpoint/2010/main" spd="slow" p14:dur="2000">
+        <p159:morph option="byObject"/>
+      </p:transition>
+    </mc:Choice>
+    <mc:Fallback>
+      <p:transition spd="slow">
+        <p:fade/>
+      </p:transition>
+    </mc:Fallback>
+  </mc:AlternateContent>
+</p:sld>
+</file>
+
+<file path=ppt/slides/slide3.xml><?xml version="1.0" encoding="utf-8"?>
 <p:sld xmlns:a="http://schemas.openxmlformats.org/drawingml/2006/main" xmlns:r="http://schemas.openxmlformats.org/officeDocument/2006/relationships" xmlns:p="http://schemas.openxmlformats.org/presentationml/2006/main">
   <p:cSld>
     <p:bg>
@@ -8141,7 +9512,7 @@
       </p:grpSpPr>
       <p:sp>
         <p:nvSpPr>
-          <p:cNvPr id="12" name="Rectangle 11">
+          <p:cNvPr id="11" name="Rectangle 10">
             <a:extLst>
               <a:ext uri="{FF2B5EF4-FFF2-40B4-BE49-F238E27FC236}">
                 <a16:creationId xmlns:a16="http://schemas.microsoft.com/office/drawing/2014/main" id="{9228552E-C8B1-4A80-8448-0787CE0FC704}"/>
@@ -8204,1070 +9575,6 @@
       </p:sp>
       <p:pic>
         <p:nvPicPr>
-          <p:cNvPr id="7" name="Afbeelding 6" descr="Afbeelding met wiel, speelgoed, band, Schaalmodel&#10;&#10;Door AI gegenereerde inhoud is mogelijk onjuist.">
-            <a:extLst>
-              <a:ext uri="{FF2B5EF4-FFF2-40B4-BE49-F238E27FC236}">
-                <a16:creationId xmlns:a16="http://schemas.microsoft.com/office/drawing/2014/main" id="{2FCAF7F1-58E8-A9D6-4857-4F4F68856BC6}"/>
-              </a:ext>
-            </a:extLst>
-          </p:cNvPr>
-          <p:cNvPicPr>
-            <a:picLocks noChangeAspect="1"/>
-          </p:cNvPicPr>
-          <p:nvPr/>
-        </p:nvPicPr>
-        <p:blipFill>
-          <a:blip r:embed="rId2">
-            <a:alphaModFix amt="35000"/>
-            <a:extLst>
-              <a:ext uri="{28A0092B-C50C-407E-A947-70E740481C1C}">
-                <a14:useLocalDpi xmlns:a14="http://schemas.microsoft.com/office/drawing/2010/main" val="0"/>
-              </a:ext>
-            </a:extLst>
-          </a:blip>
-          <a:srcRect/>
-          <a:stretch>
-            <a:fillRect/>
-          </a:stretch>
-        </p:blipFill>
-        <p:spPr>
-          <a:xfrm>
-            <a:off x="20" y="10"/>
-            <a:ext cx="12191980" cy="6857990"/>
-          </a:xfrm>
-          <a:prstGeom prst="rect">
-            <a:avLst/>
-          </a:prstGeom>
-        </p:spPr>
-      </p:pic>
-      <p:sp>
-        <p:nvSpPr>
-          <p:cNvPr id="2" name="Titel 1">
-            <a:extLst>
-              <a:ext uri="{FF2B5EF4-FFF2-40B4-BE49-F238E27FC236}">
-                <a16:creationId xmlns:a16="http://schemas.microsoft.com/office/drawing/2014/main" id="{B1E09D67-DBE7-8B54-8C1F-E9D9CA3D84BE}"/>
-              </a:ext>
-            </a:extLst>
-          </p:cNvPr>
-          <p:cNvSpPr>
-            <a:spLocks noGrp="1"/>
-          </p:cNvSpPr>
-          <p:nvPr>
-            <p:ph type="title"/>
-          </p:nvPr>
-        </p:nvSpPr>
-        <p:spPr>
-          <a:xfrm>
-            <a:off x="838200" y="365125"/>
-            <a:ext cx="10515600" cy="1325563"/>
-          </a:xfrm>
-        </p:spPr>
-        <p:txBody>
-          <a:bodyPr>
-            <a:normAutofit/>
-          </a:bodyPr>
-          <a:lstStyle/>
-          <a:p>
-            <a:r>
-              <a:rPr lang="nl-BE" noProof="0" dirty="0">
-                <a:solidFill>
-                  <a:srgbClr val="FFFFFF"/>
-                </a:solidFill>
-              </a:rPr>
-              <a:t>Website</a:t>
-            </a:r>
-          </a:p>
-        </p:txBody>
-      </p:sp>
-      <p:sp>
-        <p:nvSpPr>
-          <p:cNvPr id="3" name="Tijdelijke aanduiding voor inhoud 2">
-            <a:extLst>
-              <a:ext uri="{FF2B5EF4-FFF2-40B4-BE49-F238E27FC236}">
-                <a16:creationId xmlns:a16="http://schemas.microsoft.com/office/drawing/2014/main" id="{AF85832B-89D0-1109-9775-C6272C565C70}"/>
-              </a:ext>
-            </a:extLst>
-          </p:cNvPr>
-          <p:cNvSpPr>
-            <a:spLocks noGrp="1"/>
-          </p:cNvSpPr>
-          <p:nvPr>
-            <p:ph idx="1"/>
-          </p:nvPr>
-        </p:nvSpPr>
-        <p:spPr>
-          <a:xfrm>
-            <a:off x="838200" y="1825625"/>
-            <a:ext cx="10515600" cy="4351338"/>
-          </a:xfrm>
-        </p:spPr>
-        <p:txBody>
-          <a:bodyPr>
-            <a:normAutofit/>
-          </a:bodyPr>
-          <a:lstStyle/>
-          <a:p>
-            <a:r>
-              <a:rPr lang="nl-BE" noProof="0" dirty="0">
-                <a:solidFill>
-                  <a:srgbClr val="FFFFFF"/>
-                </a:solidFill>
-              </a:rPr>
-              <a:t>Waarom?</a:t>
-            </a:r>
-          </a:p>
-          <a:p>
-            <a:pPr lvl="1">
-              <a:buFont typeface="Courier New" panose="02070309020205020404" pitchFamily="49" charset="0"/>
-              <a:buChar char="o"/>
-            </a:pPr>
-            <a:r>
-              <a:rPr lang="nl-BE" noProof="0" dirty="0">
-                <a:solidFill>
-                  <a:srgbClr val="FFFFFF"/>
-                </a:solidFill>
-              </a:rPr>
-              <a:t>Uitleg geven over robot</a:t>
-            </a:r>
-          </a:p>
-          <a:p>
-            <a:r>
-              <a:rPr lang="nl-BE" noProof="0" dirty="0">
-                <a:solidFill>
-                  <a:srgbClr val="FFFFFF"/>
-                </a:solidFill>
-              </a:rPr>
-              <a:t>Programmeertaal</a:t>
-            </a:r>
-          </a:p>
-          <a:p>
-            <a:pPr lvl="1">
-              <a:buFont typeface="Courier New" panose="02070309020205020404" pitchFamily="49" charset="0"/>
-              <a:buChar char="o"/>
-            </a:pPr>
-            <a:r>
-              <a:rPr lang="nl-BE" noProof="0" dirty="0">
-                <a:solidFill>
-                  <a:srgbClr val="FFFFFF"/>
-                </a:solidFill>
-              </a:rPr>
-              <a:t>HTML</a:t>
-            </a:r>
-          </a:p>
-          <a:p>
-            <a:pPr lvl="1">
-              <a:buFont typeface="Courier New" panose="02070309020205020404" pitchFamily="49" charset="0"/>
-              <a:buChar char="o"/>
-            </a:pPr>
-            <a:r>
-              <a:rPr lang="nl-BE" noProof="0" dirty="0">
-                <a:solidFill>
-                  <a:srgbClr val="FFFFFF"/>
-                </a:solidFill>
-              </a:rPr>
-              <a:t>CSS</a:t>
-            </a:r>
-          </a:p>
-          <a:p>
-            <a:endParaRPr lang="nl-BE" noProof="0" dirty="0">
-              <a:solidFill>
-                <a:srgbClr val="FFFFFF"/>
-              </a:solidFill>
-            </a:endParaRPr>
-          </a:p>
-        </p:txBody>
-      </p:sp>
-      <p:sp>
-        <p:nvSpPr>
-          <p:cNvPr id="4" name="Tijdelijke aanduiding voor voettekst 3">
-            <a:extLst>
-              <a:ext uri="{FF2B5EF4-FFF2-40B4-BE49-F238E27FC236}">
-                <a16:creationId xmlns:a16="http://schemas.microsoft.com/office/drawing/2014/main" id="{ED3A6253-2723-0083-B389-553B856DE705}"/>
-              </a:ext>
-            </a:extLst>
-          </p:cNvPr>
-          <p:cNvSpPr>
-            <a:spLocks noGrp="1"/>
-          </p:cNvSpPr>
-          <p:nvPr>
-            <p:ph type="ftr" sz="quarter" idx="11"/>
-          </p:nvPr>
-        </p:nvSpPr>
-        <p:spPr>
-          <a:xfrm>
-            <a:off x="4038600" y="6356350"/>
-            <a:ext cx="4114800" cy="365125"/>
-          </a:xfrm>
-        </p:spPr>
-        <p:txBody>
-          <a:bodyPr>
-            <a:normAutofit/>
-          </a:bodyPr>
-          <a:lstStyle/>
-          <a:p>
-            <a:r>
-              <a:rPr lang="nl-BE" noProof="0" dirty="0">
-                <a:solidFill>
-                  <a:srgbClr val="FFFFFF"/>
-                </a:solidFill>
-              </a:rPr>
-              <a:t>Extra</a:t>
-            </a:r>
-          </a:p>
-        </p:txBody>
-      </p:sp>
-      <p:sp>
-        <p:nvSpPr>
-          <p:cNvPr id="5" name="Tijdelijke aanduiding voor dianummer 4">
-            <a:extLst>
-              <a:ext uri="{FF2B5EF4-FFF2-40B4-BE49-F238E27FC236}">
-                <a16:creationId xmlns:a16="http://schemas.microsoft.com/office/drawing/2014/main" id="{2E5275C4-923E-0A92-983C-6D00DE4E4ECF}"/>
-              </a:ext>
-            </a:extLst>
-          </p:cNvPr>
-          <p:cNvSpPr>
-            <a:spLocks noGrp="1"/>
-          </p:cNvSpPr>
-          <p:nvPr>
-            <p:ph type="sldNum" sz="quarter" idx="12"/>
-          </p:nvPr>
-        </p:nvSpPr>
-        <p:spPr>
-          <a:xfrm>
-            <a:off x="8610600" y="6356350"/>
-            <a:ext cx="2743200" cy="365125"/>
-          </a:xfrm>
-        </p:spPr>
-        <p:txBody>
-          <a:bodyPr>
-            <a:normAutofit/>
-          </a:bodyPr>
-          <a:lstStyle/>
-          <a:p>
-            <a:pPr>
-              <a:spcAft>
-                <a:spcPts val="600"/>
-              </a:spcAft>
-            </a:pPr>
-            <a:fld id="{CF769C61-EDDB-4958-A626-BA0E0F3C6BBE}" type="slidenum">
-              <a:rPr lang="nl-BE" noProof="0">
-                <a:solidFill>
-                  <a:srgbClr val="FFFFFF"/>
-                </a:solidFill>
-              </a:rPr>
-              <a:pPr>
-                <a:spcAft>
-                  <a:spcPts val="600"/>
-                </a:spcAft>
-              </a:pPr>
-              <a:t>20</a:t>
-            </a:fld>
-            <a:endParaRPr lang="nl-BE" noProof="0" dirty="0">
-              <a:solidFill>
-                <a:srgbClr val="FFFFFF"/>
-              </a:solidFill>
-            </a:endParaRPr>
-          </a:p>
-        </p:txBody>
-      </p:sp>
-    </p:spTree>
-    <p:extLst>
-      <p:ext uri="{BB962C8B-B14F-4D97-AF65-F5344CB8AC3E}">
-        <p14:creationId xmlns:p14="http://schemas.microsoft.com/office/powerpoint/2010/main" val="3898959155"/>
-      </p:ext>
-    </p:extLst>
-  </p:cSld>
-  <p:clrMapOvr>
-    <a:overrideClrMapping bg1="dk1" tx1="lt1" bg2="dk2" tx2="lt2" accent1="accent1" accent2="accent2" accent3="accent3" accent4="accent4" accent5="accent5" accent6="accent6" hlink="hlink" folHlink="folHlink"/>
-  </p:clrMapOvr>
-  <mc:AlternateContent xmlns:mc="http://schemas.openxmlformats.org/markup-compatibility/2006" xmlns:p14="http://schemas.microsoft.com/office/powerpoint/2010/main">
-    <mc:Choice Requires="p14">
-      <p:transition spd="med" p14:dur="700">
-        <p:fade/>
-      </p:transition>
-    </mc:Choice>
-    <mc:Fallback xmlns="">
-      <p:transition spd="med">
-        <p:fade/>
-      </p:transition>
-    </mc:Fallback>
-  </mc:AlternateContent>
-</p:sld>
-</file>
-
-<file path=ppt/slides/slide21.xml><?xml version="1.0" encoding="utf-8"?>
-<p:sld xmlns:a="http://schemas.openxmlformats.org/drawingml/2006/main" xmlns:r="http://schemas.openxmlformats.org/officeDocument/2006/relationships" xmlns:p="http://schemas.openxmlformats.org/presentationml/2006/main">
-  <p:cSld>
-    <p:bg>
-      <p:bgPr>
-        <a:solidFill>
-          <a:srgbClr val="000000"/>
-        </a:solidFill>
-        <a:effectLst/>
-      </p:bgPr>
-    </p:bg>
-    <p:spTree>
-      <p:nvGrpSpPr>
-        <p:cNvPr id="1" name=""/>
-        <p:cNvGrpSpPr/>
-        <p:nvPr/>
-      </p:nvGrpSpPr>
-      <p:grpSpPr>
-        <a:xfrm>
-          <a:off x="0" y="0"/>
-          <a:ext cx="0" cy="0"/>
-          <a:chOff x="0" y="0"/>
-          <a:chExt cx="0" cy="0"/>
-        </a:xfrm>
-      </p:grpSpPr>
-      <p:sp>
-        <p:nvSpPr>
-          <p:cNvPr id="12" name="Rectangle 11">
-            <a:extLst>
-              <a:ext uri="{FF2B5EF4-FFF2-40B4-BE49-F238E27FC236}">
-                <a16:creationId xmlns:a16="http://schemas.microsoft.com/office/drawing/2014/main" id="{71B2258F-86CA-4D4D-8270-BC05FCDEBFB3}"/>
-              </a:ext>
-              <a:ext uri="{C183D7F6-B498-43B3-948B-1728B52AA6E4}">
-                <adec:decorative xmlns:adec="http://schemas.microsoft.com/office/drawing/2017/decorative" val="1"/>
-              </a:ext>
-            </a:extLst>
-          </p:cNvPr>
-          <p:cNvSpPr>
-            <a:spLocks noGrp="1" noRot="1" noChangeAspect="1" noMove="1" noResize="1" noEditPoints="1" noAdjustHandles="1" noChangeArrowheads="1" noChangeShapeType="1" noTextEdit="1"/>
-          </p:cNvSpPr>
-          <p:nvPr>
-            <p:extLst>
-              <p:ext uri="{386F3935-93C4-4BCD-93E2-E3B085C9AB24}">
-                <p16:designElem xmlns:p16="http://schemas.microsoft.com/office/powerpoint/2015/main" val="1"/>
-              </p:ext>
-            </p:extLst>
-          </p:nvPr>
-        </p:nvSpPr>
-        <p:spPr>
-          <a:xfrm>
-            <a:off x="0" y="0"/>
-            <a:ext cx="12192000" cy="6857999"/>
-          </a:xfrm>
-          <a:prstGeom prst="rect">
-            <a:avLst/>
-          </a:prstGeom>
-          <a:solidFill>
-            <a:srgbClr val="000000"/>
-          </a:solidFill>
-          <a:ln>
-            <a:noFill/>
-          </a:ln>
-        </p:spPr>
-        <p:style>
-          <a:lnRef idx="2">
-            <a:schemeClr val="accent1">
-              <a:shade val="50000"/>
-            </a:schemeClr>
-          </a:lnRef>
-          <a:fillRef idx="1">
-            <a:schemeClr val="accent1"/>
-          </a:fillRef>
-          <a:effectRef idx="0">
-            <a:schemeClr val="accent1"/>
-          </a:effectRef>
-          <a:fontRef idx="minor">
-            <a:schemeClr val="lt1"/>
-          </a:fontRef>
-        </p:style>
-        <p:txBody>
-          <a:bodyPr rtlCol="0" anchor="ctr"/>
-          <a:lstStyle/>
-          <a:p>
-            <a:pPr algn="ctr"/>
-            <a:endParaRPr lang="nl-BE" noProof="0" dirty="0"/>
-          </a:p>
-        </p:txBody>
-      </p:sp>
-      <p:pic>
-        <p:nvPicPr>
-          <p:cNvPr id="7" name="Afbeelding 6" descr="Afbeelding met wiel, speelgoed, band, Schaalmodel">
-            <a:extLst>
-              <a:ext uri="{FF2B5EF4-FFF2-40B4-BE49-F238E27FC236}">
-                <a16:creationId xmlns:a16="http://schemas.microsoft.com/office/drawing/2014/main" id="{D5E9569F-6545-7911-8A56-79FBAA6E6A99}"/>
-              </a:ext>
-            </a:extLst>
-          </p:cNvPr>
-          <p:cNvPicPr>
-            <a:picLocks noChangeAspect="1"/>
-          </p:cNvPicPr>
-          <p:nvPr/>
-        </p:nvPicPr>
-        <p:blipFill>
-          <a:blip r:embed="rId2">
-            <a:alphaModFix amt="50000"/>
-            <a:extLst>
-              <a:ext uri="{28A0092B-C50C-407E-A947-70E740481C1C}">
-                <a14:useLocalDpi xmlns:a14="http://schemas.microsoft.com/office/drawing/2010/main" val="0"/>
-              </a:ext>
-            </a:extLst>
-          </a:blip>
-          <a:srcRect/>
-          <a:stretch>
-            <a:fillRect/>
-          </a:stretch>
-        </p:blipFill>
-        <p:spPr>
-          <a:xfrm>
-            <a:off x="20" y="1"/>
-            <a:ext cx="12191980" cy="6857999"/>
-          </a:xfrm>
-          <a:prstGeom prst="rect">
-            <a:avLst/>
-          </a:prstGeom>
-        </p:spPr>
-      </p:pic>
-      <p:sp>
-        <p:nvSpPr>
-          <p:cNvPr id="2" name="Titel 1">
-            <a:extLst>
-              <a:ext uri="{FF2B5EF4-FFF2-40B4-BE49-F238E27FC236}">
-                <a16:creationId xmlns:a16="http://schemas.microsoft.com/office/drawing/2014/main" id="{8B86BA1F-360B-8053-5AE0-6C35A24D1511}"/>
-              </a:ext>
-            </a:extLst>
-          </p:cNvPr>
-          <p:cNvSpPr>
-            <a:spLocks noGrp="1"/>
-          </p:cNvSpPr>
-          <p:nvPr>
-            <p:ph type="title"/>
-          </p:nvPr>
-        </p:nvSpPr>
-        <p:spPr>
-          <a:xfrm>
-            <a:off x="1524000" y="1122362"/>
-            <a:ext cx="9144000" cy="2900518"/>
-          </a:xfrm>
-        </p:spPr>
-        <p:txBody>
-          <a:bodyPr vert="horz" lIns="91440" tIns="45720" rIns="91440" bIns="45720" rtlCol="0" anchor="b">
-            <a:normAutofit/>
-          </a:bodyPr>
-          <a:lstStyle/>
-          <a:p>
-            <a:pPr algn="ctr"/>
-            <a:r>
-              <a:rPr lang="nl-BE" sz="6000" noProof="0" dirty="0">
-                <a:solidFill>
-                  <a:srgbClr val="FFFFFF"/>
-                </a:solidFill>
-              </a:rPr>
-              <a:t>Einde</a:t>
-            </a:r>
-          </a:p>
-        </p:txBody>
-      </p:sp>
-      <p:sp>
-        <p:nvSpPr>
-          <p:cNvPr id="3" name="Tijdelijke aanduiding voor inhoud 2">
-            <a:extLst>
-              <a:ext uri="{FF2B5EF4-FFF2-40B4-BE49-F238E27FC236}">
-                <a16:creationId xmlns:a16="http://schemas.microsoft.com/office/drawing/2014/main" id="{38785E8D-D7B0-5680-9F28-0D7E13AC86E4}"/>
-              </a:ext>
-            </a:extLst>
-          </p:cNvPr>
-          <p:cNvSpPr>
-            <a:spLocks noGrp="1"/>
-          </p:cNvSpPr>
-          <p:nvPr>
-            <p:ph idx="1"/>
-          </p:nvPr>
-        </p:nvSpPr>
-        <p:spPr>
-          <a:xfrm>
-            <a:off x="1524000" y="4159404"/>
-            <a:ext cx="9144000" cy="1098395"/>
-          </a:xfrm>
-        </p:spPr>
-        <p:txBody>
-          <a:bodyPr vert="horz" lIns="91440" tIns="45720" rIns="91440" bIns="45720" rtlCol="0">
-            <a:normAutofit/>
-          </a:bodyPr>
-          <a:lstStyle/>
-          <a:p>
-            <a:pPr marL="0" indent="0" algn="ctr">
-              <a:buNone/>
-            </a:pPr>
-            <a:r>
-              <a:rPr lang="nl-BE" sz="2400" noProof="0" dirty="0">
-                <a:solidFill>
-                  <a:srgbClr val="FFFFFF"/>
-                </a:solidFill>
-              </a:rPr>
-              <a:t>Zijn er nog vragen?</a:t>
-            </a:r>
-          </a:p>
-        </p:txBody>
-      </p:sp>
-      <p:sp>
-        <p:nvSpPr>
-          <p:cNvPr id="4" name="Tijdelijke aanduiding voor voettekst 3">
-            <a:extLst>
-              <a:ext uri="{FF2B5EF4-FFF2-40B4-BE49-F238E27FC236}">
-                <a16:creationId xmlns:a16="http://schemas.microsoft.com/office/drawing/2014/main" id="{CE5F77B0-7490-9193-423E-DE9CF91AF79D}"/>
-              </a:ext>
-            </a:extLst>
-          </p:cNvPr>
-          <p:cNvSpPr>
-            <a:spLocks noGrp="1"/>
-          </p:cNvSpPr>
-          <p:nvPr>
-            <p:ph type="ftr" sz="quarter" idx="11"/>
-          </p:nvPr>
-        </p:nvSpPr>
-        <p:spPr>
-          <a:xfrm>
-            <a:off x="4038600" y="6356350"/>
-            <a:ext cx="4114800" cy="365125"/>
-          </a:xfrm>
-        </p:spPr>
-        <p:txBody>
-          <a:bodyPr vert="horz" lIns="91440" tIns="45720" rIns="91440" bIns="45720" rtlCol="0" anchor="ctr">
-            <a:normAutofit/>
-          </a:bodyPr>
-          <a:lstStyle/>
-          <a:p>
-            <a:pPr>
-              <a:defRPr/>
-            </a:pPr>
-            <a:r>
-              <a:rPr lang="nl-BE" kern="1200" noProof="0" dirty="0">
-                <a:solidFill>
-                  <a:srgbClr val="FFFFFF"/>
-                </a:solidFill>
-                <a:latin typeface="Calibri" panose="020F0502020204030204"/>
-                <a:ea typeface="+mn-ea"/>
-                <a:cs typeface="+mn-cs"/>
-              </a:rPr>
-              <a:t>Afsluiter</a:t>
-            </a:r>
-          </a:p>
-        </p:txBody>
-      </p:sp>
-      <p:sp>
-        <p:nvSpPr>
-          <p:cNvPr id="5" name="Tijdelijke aanduiding voor dianummer 4">
-            <a:extLst>
-              <a:ext uri="{FF2B5EF4-FFF2-40B4-BE49-F238E27FC236}">
-                <a16:creationId xmlns:a16="http://schemas.microsoft.com/office/drawing/2014/main" id="{6858B3D6-4257-82F2-B062-FC49355323F5}"/>
-              </a:ext>
-            </a:extLst>
-          </p:cNvPr>
-          <p:cNvSpPr>
-            <a:spLocks noGrp="1"/>
-          </p:cNvSpPr>
-          <p:nvPr>
-            <p:ph type="sldNum" sz="quarter" idx="12"/>
-          </p:nvPr>
-        </p:nvSpPr>
-        <p:spPr>
-          <a:xfrm>
-            <a:off x="8610600" y="6356350"/>
-            <a:ext cx="2743200" cy="365125"/>
-          </a:xfrm>
-        </p:spPr>
-        <p:txBody>
-          <a:bodyPr vert="horz" lIns="91440" tIns="45720" rIns="91440" bIns="45720" rtlCol="0" anchor="ctr">
-            <a:normAutofit/>
-          </a:bodyPr>
-          <a:lstStyle/>
-          <a:p>
-            <a:pPr>
-              <a:spcAft>
-                <a:spcPts val="600"/>
-              </a:spcAft>
-              <a:defRPr/>
-            </a:pPr>
-            <a:fld id="{CF769C61-EDDB-4958-A626-BA0E0F3C6BBE}" type="slidenum">
-              <a:rPr lang="nl-BE" noProof="0" smtClean="0">
-                <a:solidFill>
-                  <a:srgbClr val="FFFFFF"/>
-                </a:solidFill>
-                <a:latin typeface="Calibri" panose="020F0502020204030204"/>
-              </a:rPr>
-              <a:pPr>
-                <a:spcAft>
-                  <a:spcPts val="600"/>
-                </a:spcAft>
-                <a:defRPr/>
-              </a:pPr>
-              <a:t>21</a:t>
-            </a:fld>
-            <a:endParaRPr lang="nl-BE" noProof="0" dirty="0">
-              <a:solidFill>
-                <a:srgbClr val="FFFFFF"/>
-              </a:solidFill>
-              <a:latin typeface="Calibri" panose="020F0502020204030204"/>
-            </a:endParaRPr>
-          </a:p>
-        </p:txBody>
-      </p:sp>
-    </p:spTree>
-    <p:extLst>
-      <p:ext uri="{BB962C8B-B14F-4D97-AF65-F5344CB8AC3E}">
-        <p14:creationId xmlns:p14="http://schemas.microsoft.com/office/powerpoint/2010/main" val="1322337779"/>
-      </p:ext>
-    </p:extLst>
-  </p:cSld>
-  <p:clrMapOvr>
-    <a:overrideClrMapping bg1="dk1" tx1="lt1" bg2="dk2" tx2="lt2" accent1="accent1" accent2="accent2" accent3="accent3" accent4="accent4" accent5="accent5" accent6="accent6" hlink="hlink" folHlink="folHlink"/>
-  </p:clrMapOvr>
-  <mc:AlternateContent xmlns:mc="http://schemas.openxmlformats.org/markup-compatibility/2006" xmlns:p14="http://schemas.microsoft.com/office/powerpoint/2010/main">
-    <mc:Choice Requires="p14">
-      <p:transition spd="med" p14:dur="700">
-        <p:fade/>
-      </p:transition>
-    </mc:Choice>
-    <mc:Fallback xmlns="">
-      <p:transition spd="med">
-        <p:fade/>
-      </p:transition>
-    </mc:Fallback>
-  </mc:AlternateContent>
-  <p:timing>
-    <p:tnLst>
-      <p:par>
-        <p:cTn id="1" dur="indefinite" restart="never" nodeType="tmRoot">
-          <p:childTnLst>
-            <p:seq concurrent="1" nextAc="seek">
-              <p:cTn id="2" dur="indefinite" nodeType="mainSeq">
-                <p:childTnLst>
-                  <p:par>
-                    <p:cTn id="3" fill="hold">
-                      <p:stCondLst>
-                        <p:cond delay="indefinite"/>
-                      </p:stCondLst>
-                      <p:childTnLst>
-                        <p:par>
-                          <p:cTn id="4" fill="hold">
-                            <p:stCondLst>
-                              <p:cond delay="0"/>
-                            </p:stCondLst>
-                            <p:childTnLst>
-                              <p:par>
-                                <p:cTn id="5" presetID="31" presetClass="exit" presetSubtype="0" fill="hold" grpId="0" nodeType="clickEffect">
-                                  <p:stCondLst>
-                                    <p:cond delay="0"/>
-                                  </p:stCondLst>
-                                  <p:childTnLst>
-                                    <p:anim calcmode="lin" valueType="num">
-                                      <p:cBhvr>
-                                        <p:cTn id="6" dur="1000"/>
-                                        <p:tgtEl>
-                                          <p:spTgt spid="2"/>
-                                        </p:tgtEl>
-                                        <p:attrNameLst>
-                                          <p:attrName>ppt_w</p:attrName>
-                                        </p:attrNameLst>
-                                      </p:cBhvr>
-                                      <p:tavLst>
-                                        <p:tav tm="0">
-                                          <p:val>
-                                            <p:strVal val="ppt_w"/>
-                                          </p:val>
-                                        </p:tav>
-                                        <p:tav tm="100000">
-                                          <p:val>
-                                            <p:fltVal val="0"/>
-                                          </p:val>
-                                        </p:tav>
-                                      </p:tavLst>
-                                    </p:anim>
-                                    <p:anim calcmode="lin" valueType="num">
-                                      <p:cBhvr>
-                                        <p:cTn id="7" dur="1000"/>
-                                        <p:tgtEl>
-                                          <p:spTgt spid="2"/>
-                                        </p:tgtEl>
-                                        <p:attrNameLst>
-                                          <p:attrName>ppt_h</p:attrName>
-                                        </p:attrNameLst>
-                                      </p:cBhvr>
-                                      <p:tavLst>
-                                        <p:tav tm="0">
-                                          <p:val>
-                                            <p:strVal val="ppt_h"/>
-                                          </p:val>
-                                        </p:tav>
-                                        <p:tav tm="100000">
-                                          <p:val>
-                                            <p:fltVal val="0"/>
-                                          </p:val>
-                                        </p:tav>
-                                      </p:tavLst>
-                                    </p:anim>
-                                    <p:anim calcmode="lin" valueType="num">
-                                      <p:cBhvr>
-                                        <p:cTn id="8" dur="1000"/>
-                                        <p:tgtEl>
-                                          <p:spTgt spid="2"/>
-                                        </p:tgtEl>
-                                        <p:attrNameLst>
-                                          <p:attrName>style.rotation</p:attrName>
-                                        </p:attrNameLst>
-                                      </p:cBhvr>
-                                      <p:tavLst>
-                                        <p:tav tm="0">
-                                          <p:val>
-                                            <p:fltVal val="0"/>
-                                          </p:val>
-                                        </p:tav>
-                                        <p:tav tm="100000">
-                                          <p:val>
-                                            <p:fltVal val="90"/>
-                                          </p:val>
-                                        </p:tav>
-                                      </p:tavLst>
-                                    </p:anim>
-                                    <p:animEffect transition="out" filter="fade">
-                                      <p:cBhvr>
-                                        <p:cTn id="9" dur="1000"/>
-                                        <p:tgtEl>
-                                          <p:spTgt spid="2"/>
-                                        </p:tgtEl>
-                                      </p:cBhvr>
-                                    </p:animEffect>
-                                    <p:set>
-                                      <p:cBhvr>
-                                        <p:cTn id="10" dur="1" fill="hold">
-                                          <p:stCondLst>
-                                            <p:cond delay="999"/>
-                                          </p:stCondLst>
-                                        </p:cTn>
-                                        <p:tgtEl>
-                                          <p:spTgt spid="2"/>
-                                        </p:tgtEl>
-                                        <p:attrNameLst>
-                                          <p:attrName>style.visibility</p:attrName>
-                                        </p:attrNameLst>
-                                      </p:cBhvr>
-                                      <p:to>
-                                        <p:strVal val="hidden"/>
-                                      </p:to>
-                                    </p:set>
-                                  </p:childTnLst>
-                                </p:cTn>
-                              </p:par>
-                              <p:par>
-                                <p:cTn id="11" presetID="45" presetClass="exit" presetSubtype="0" fill="hold" nodeType="withEffect">
-                                  <p:stCondLst>
-                                    <p:cond delay="0"/>
-                                  </p:stCondLst>
-                                  <p:childTnLst>
-                                    <p:animEffect transition="out" filter="fade">
-                                      <p:cBhvr>
-                                        <p:cTn id="12" dur="2000"/>
-                                        <p:tgtEl>
-                                          <p:spTgt spid="3">
-                                            <p:txEl>
-                                              <p:pRg st="0" end="0"/>
-                                            </p:txEl>
-                                          </p:spTgt>
-                                        </p:tgtEl>
-                                      </p:cBhvr>
-                                    </p:animEffect>
-                                    <p:anim calcmode="lin" valueType="num">
-                                      <p:cBhvr>
-                                        <p:cTn id="13" dur="2000"/>
-                                        <p:tgtEl>
-                                          <p:spTgt spid="3">
-                                            <p:txEl>
-                                              <p:pRg st="0" end="0"/>
-                                            </p:txEl>
-                                          </p:spTgt>
-                                        </p:tgtEl>
-                                        <p:attrNameLst>
-                                          <p:attrName>ppt_w</p:attrName>
-                                        </p:attrNameLst>
-                                      </p:cBhvr>
-                                      <p:tavLst>
-                                        <p:tav tm="0">
-                                          <p:val>
-                                            <p:strVal val="ppt_w"/>
-                                          </p:val>
-                                        </p:tav>
-                                        <p:tav tm="5000">
-                                          <p:val>
-                                            <p:strVal val="0.92*ppt_w"/>
-                                          </p:val>
-                                        </p:tav>
-                                        <p:tav tm="10000">
-                                          <p:val>
-                                            <p:strVal val="0.71*ppt_w"/>
-                                          </p:val>
-                                        </p:tav>
-                                        <p:tav tm="15000">
-                                          <p:val>
-                                            <p:strVal val="0.38*ppt_w"/>
-                                          </p:val>
-                                        </p:tav>
-                                        <p:tav tm="20000">
-                                          <p:val>
-                                            <p:fltVal val="0"/>
-                                          </p:val>
-                                        </p:tav>
-                                        <p:tav tm="25000">
-                                          <p:val>
-                                            <p:strVal val="-0.38*ppt_w"/>
-                                          </p:val>
-                                        </p:tav>
-                                        <p:tav tm="30000">
-                                          <p:val>
-                                            <p:strVal val="-0.71*ppt_w"/>
-                                          </p:val>
-                                        </p:tav>
-                                        <p:tav tm="35000">
-                                          <p:val>
-                                            <p:strVal val="-0.92*ppt_w"/>
-                                          </p:val>
-                                        </p:tav>
-                                        <p:tav tm="40000">
-                                          <p:val>
-                                            <p:strVal val="-ppt_w"/>
-                                          </p:val>
-                                        </p:tav>
-                                        <p:tav tm="45000">
-                                          <p:val>
-                                            <p:strVal val="-0.92*ppt_w"/>
-                                          </p:val>
-                                        </p:tav>
-                                        <p:tav tm="50000">
-                                          <p:val>
-                                            <p:strVal val="-0.71*ppt_w"/>
-                                          </p:val>
-                                        </p:tav>
-                                        <p:tav tm="55000">
-                                          <p:val>
-                                            <p:strVal val="-0.38*ppt_w"/>
-                                          </p:val>
-                                        </p:tav>
-                                        <p:tav tm="60000">
-                                          <p:val>
-                                            <p:fltVal val="0"/>
-                                          </p:val>
-                                        </p:tav>
-                                        <p:tav tm="65000">
-                                          <p:val>
-                                            <p:strVal val="0.38*ppt_w"/>
-                                          </p:val>
-                                        </p:tav>
-                                        <p:tav tm="70000">
-                                          <p:val>
-                                            <p:strVal val="0.71*ppt_w"/>
-                                          </p:val>
-                                        </p:tav>
-                                        <p:tav tm="75000">
-                                          <p:val>
-                                            <p:strVal val="0.92*ppt_w"/>
-                                          </p:val>
-                                        </p:tav>
-                                        <p:tav tm="80000">
-                                          <p:val>
-                                            <p:strVal val="ppt_w"/>
-                                          </p:val>
-                                        </p:tav>
-                                        <p:tav tm="85000">
-                                          <p:val>
-                                            <p:strVal val="0.92*ppt_w"/>
-                                          </p:val>
-                                        </p:tav>
-                                        <p:tav tm="90000">
-                                          <p:val>
-                                            <p:strVal val="0.71*ppt_w"/>
-                                          </p:val>
-                                        </p:tav>
-                                        <p:tav tm="95000">
-                                          <p:val>
-                                            <p:strVal val="0.38*ppt_w"/>
-                                          </p:val>
-                                        </p:tav>
-                                        <p:tav tm="100000">
-                                          <p:val>
-                                            <p:fltVal val="0"/>
-                                          </p:val>
-                                        </p:tav>
-                                      </p:tavLst>
-                                    </p:anim>
-                                    <p:anim calcmode="lin" valueType="num">
-                                      <p:cBhvr>
-                                        <p:cTn id="14" dur="2000"/>
-                                        <p:tgtEl>
-                                          <p:spTgt spid="3">
-                                            <p:txEl>
-                                              <p:pRg st="0" end="0"/>
-                                            </p:txEl>
-                                          </p:spTgt>
-                                        </p:tgtEl>
-                                        <p:attrNameLst>
-                                          <p:attrName>ppt_h</p:attrName>
-                                        </p:attrNameLst>
-                                      </p:cBhvr>
-                                      <p:tavLst>
-                                        <p:tav tm="0">
-                                          <p:val>
-                                            <p:strVal val="ppt_h"/>
-                                          </p:val>
-                                        </p:tav>
-                                        <p:tav tm="100000">
-                                          <p:val>
-                                            <p:strVal val="ppt_h"/>
-                                          </p:val>
-                                        </p:tav>
-                                      </p:tavLst>
-                                    </p:anim>
-                                    <p:set>
-                                      <p:cBhvr>
-                                        <p:cTn id="15" dur="1" fill="hold">
-                                          <p:stCondLst>
-                                            <p:cond delay="1999"/>
-                                          </p:stCondLst>
-                                        </p:cTn>
-                                        <p:tgtEl>
-                                          <p:spTgt spid="3">
-                                            <p:txEl>
-                                              <p:pRg st="0" end="0"/>
-                                            </p:txEl>
-                                          </p:spTgt>
-                                        </p:tgtEl>
-                                        <p:attrNameLst>
-                                          <p:attrName>style.visibility</p:attrName>
-                                        </p:attrNameLst>
-                                      </p:cBhvr>
-                                      <p:to>
-                                        <p:strVal val="hidden"/>
-                                      </p:to>
-                                    </p:set>
-                                  </p:childTnLst>
-                                </p:cTn>
-                              </p:par>
-                            </p:childTnLst>
-                          </p:cTn>
-                        </p:par>
-                      </p:childTnLst>
-                    </p:cTn>
-                  </p:par>
-                </p:childTnLst>
-              </p:cTn>
-              <p:prevCondLst>
-                <p:cond evt="onPrev" delay="0">
-                  <p:tgtEl>
-                    <p:sldTgt/>
-                  </p:tgtEl>
-                </p:cond>
-              </p:prevCondLst>
-              <p:nextCondLst>
-                <p:cond evt="onNext" delay="0">
-                  <p:tgtEl>
-                    <p:sldTgt/>
-                  </p:tgtEl>
-                </p:cond>
-              </p:nextCondLst>
-            </p:seq>
-          </p:childTnLst>
-        </p:cTn>
-      </p:par>
-    </p:tnLst>
-    <p:bldLst>
-      <p:bldP spid="2" grpId="0"/>
-    </p:bldLst>
-  </p:timing>
-</p:sld>
-</file>
-
-<file path=ppt/slides/slide3.xml><?xml version="1.0" encoding="utf-8"?>
-<p:sld xmlns:a="http://schemas.openxmlformats.org/drawingml/2006/main" xmlns:r="http://schemas.openxmlformats.org/officeDocument/2006/relationships" xmlns:p="http://schemas.openxmlformats.org/presentationml/2006/main">
-  <p:cSld>
-    <p:bg>
-      <p:bgPr>
-        <a:solidFill>
-          <a:schemeClr val="bg1"/>
-        </a:solidFill>
-        <a:effectLst/>
-      </p:bgPr>
-    </p:bg>
-    <p:spTree>
-      <p:nvGrpSpPr>
-        <p:cNvPr id="1" name=""/>
-        <p:cNvGrpSpPr/>
-        <p:nvPr/>
-      </p:nvGrpSpPr>
-      <p:grpSpPr>
-        <a:xfrm>
-          <a:off x="0" y="0"/>
-          <a:ext cx="0" cy="0"/>
-          <a:chOff x="0" y="0"/>
-          <a:chExt cx="0" cy="0"/>
-        </a:xfrm>
-      </p:grpSpPr>
-      <p:sp>
-        <p:nvSpPr>
-          <p:cNvPr id="11" name="Rectangle 10">
-            <a:extLst>
-              <a:ext uri="{FF2B5EF4-FFF2-40B4-BE49-F238E27FC236}">
-                <a16:creationId xmlns:a16="http://schemas.microsoft.com/office/drawing/2014/main" id="{9228552E-C8B1-4A80-8448-0787CE0FC704}"/>
-              </a:ext>
-              <a:ext uri="{C183D7F6-B498-43B3-948B-1728B52AA6E4}">
-                <adec:decorative xmlns:adec="http://schemas.microsoft.com/office/drawing/2017/decorative" val="1"/>
-              </a:ext>
-            </a:extLst>
-          </p:cNvPr>
-          <p:cNvSpPr>
-            <a:spLocks noGrp="1" noRot="1" noChangeAspect="1" noMove="1" noResize="1" noEditPoints="1" noAdjustHandles="1" noChangeArrowheads="1" noChangeShapeType="1" noTextEdit="1"/>
-          </p:cNvSpPr>
-          <p:nvPr>
-            <p:extLst>
-              <p:ext uri="{386F3935-93C4-4BCD-93E2-E3B085C9AB24}">
-                <p16:designElem xmlns:p16="http://schemas.microsoft.com/office/powerpoint/2015/main" val="1"/>
-              </p:ext>
-            </p:extLst>
-          </p:nvPr>
-        </p:nvSpPr>
-        <p:spPr>
-          <a:xfrm>
-            <a:off x="0" y="0"/>
-            <a:ext cx="12192000" cy="6858000"/>
-          </a:xfrm>
-          <a:prstGeom prst="rect">
-            <a:avLst/>
-          </a:prstGeom>
-          <a:solidFill>
-            <a:srgbClr val="000000"/>
-          </a:solidFill>
-          <a:ln>
-            <a:noFill/>
-          </a:ln>
-        </p:spPr>
-        <p:style>
-          <a:lnRef idx="2">
-            <a:schemeClr val="accent1">
-              <a:shade val="50000"/>
-            </a:schemeClr>
-          </a:lnRef>
-          <a:fillRef idx="1">
-            <a:schemeClr val="accent1"/>
-          </a:fillRef>
-          <a:effectRef idx="0">
-            <a:schemeClr val="accent1"/>
-          </a:effectRef>
-          <a:fontRef idx="minor">
-            <a:schemeClr val="lt1"/>
-          </a:fontRef>
-        </p:style>
-        <p:txBody>
-          <a:bodyPr rtlCol="0" anchor="ctr"/>
-          <a:lstStyle/>
-          <a:p>
-            <a:pPr algn="ctr"/>
-            <a:endParaRPr lang="nl-BE" noProof="0" dirty="0"/>
-          </a:p>
-        </p:txBody>
-      </p:sp>
-      <p:pic>
-        <p:nvPicPr>
           <p:cNvPr id="6" name="Afbeelding 5" descr="Afbeelding met wiel, speelgoed, band, Schaalmodel&#10;&#10;Door AI gegenereerde inhoud is mogelijk onjuist.">
             <a:extLst>
               <a:ext uri="{FF2B5EF4-FFF2-40B4-BE49-F238E27FC236}">
@@ -9527,14 +9834,14 @@
   <p:clrMapOvr>
     <a:overrideClrMapping bg1="dk1" tx1="lt1" bg2="dk2" tx2="lt2" accent1="accent1" accent2="accent2" accent3="accent3" accent4="accent4" accent5="accent5" accent6="accent6" hlink="hlink" folHlink="folHlink"/>
   </p:clrMapOvr>
-  <mc:AlternateContent xmlns:mc="http://schemas.openxmlformats.org/markup-compatibility/2006" xmlns:p14="http://schemas.microsoft.com/office/powerpoint/2010/main">
-    <mc:Choice Requires="p14">
-      <p:transition spd="med" p14:dur="700">
-        <p:fade/>
+  <mc:AlternateContent xmlns:mc="http://schemas.openxmlformats.org/markup-compatibility/2006">
+    <mc:Choice xmlns:p159="http://schemas.microsoft.com/office/powerpoint/2015/09/main" Requires="p159">
+      <p:transition xmlns:p14="http://schemas.microsoft.com/office/powerpoint/2010/main" spd="slow" p14:dur="2000">
+        <p159:morph option="byObject"/>
       </p:transition>
     </mc:Choice>
-    <mc:Fallback xmlns="">
-      <p:transition spd="med">
+    <mc:Fallback>
+      <p:transition spd="slow">
         <p:fade/>
       </p:transition>
     </mc:Fallback>
@@ -9895,14 +10202,14 @@
   <p:clrMapOvr>
     <a:overrideClrMapping bg1="dk1" tx1="lt1" bg2="dk2" tx2="lt2" accent1="accent1" accent2="accent2" accent3="accent3" accent4="accent4" accent5="accent5" accent6="accent6" hlink="hlink" folHlink="folHlink"/>
   </p:clrMapOvr>
-  <mc:AlternateContent xmlns:mc="http://schemas.openxmlformats.org/markup-compatibility/2006" xmlns:p14="http://schemas.microsoft.com/office/powerpoint/2010/main">
-    <mc:Choice Requires="p14">
-      <p:transition spd="med" p14:dur="700">
-        <p:fade/>
+  <mc:AlternateContent xmlns:mc="http://schemas.openxmlformats.org/markup-compatibility/2006">
+    <mc:Choice xmlns:p159="http://schemas.microsoft.com/office/powerpoint/2015/09/main" Requires="p159">
+      <p:transition xmlns:p14="http://schemas.microsoft.com/office/powerpoint/2010/main" spd="slow" p14:dur="2000">
+        <p159:morph option="byObject"/>
       </p:transition>
     </mc:Choice>
-    <mc:Fallback xmlns="">
-      <p:transition spd="med">
+    <mc:Fallback>
+      <p:transition spd="slow">
         <p:fade/>
       </p:transition>
     </mc:Fallback>
@@ -10231,14 +10538,14 @@
   <p:clrMapOvr>
     <a:overrideClrMapping bg1="dk1" tx1="lt1" bg2="dk2" tx2="lt2" accent1="accent1" accent2="accent2" accent3="accent3" accent4="accent4" accent5="accent5" accent6="accent6" hlink="hlink" folHlink="folHlink"/>
   </p:clrMapOvr>
-  <mc:AlternateContent xmlns:mc="http://schemas.openxmlformats.org/markup-compatibility/2006" xmlns:p14="http://schemas.microsoft.com/office/powerpoint/2010/main">
-    <mc:Choice Requires="p14">
-      <p:transition spd="med" p14:dur="700">
-        <p:fade/>
+  <mc:AlternateContent xmlns:mc="http://schemas.openxmlformats.org/markup-compatibility/2006">
+    <mc:Choice xmlns:p159="http://schemas.microsoft.com/office/powerpoint/2015/09/main" Requires="p159">
+      <p:transition xmlns:p14="http://schemas.microsoft.com/office/powerpoint/2010/main" spd="slow" p14:dur="2000">
+        <p159:morph option="byObject"/>
       </p:transition>
     </mc:Choice>
-    <mc:Fallback xmlns="">
-      <p:transition spd="med">
+    <mc:Fallback>
+      <p:transition spd="slow">
         <p:fade/>
       </p:transition>
     </mc:Fallback>
@@ -11937,14 +12244,14 @@
   <p:clrMapOvr>
     <a:masterClrMapping/>
   </p:clrMapOvr>
-  <mc:AlternateContent xmlns:mc="http://schemas.openxmlformats.org/markup-compatibility/2006" xmlns:p14="http://schemas.microsoft.com/office/powerpoint/2010/main">
-    <mc:Choice Requires="p14">
-      <p:transition spd="med" p14:dur="700">
-        <p:fade/>
+  <mc:AlternateContent xmlns:mc="http://schemas.openxmlformats.org/markup-compatibility/2006">
+    <mc:Choice xmlns:p159="http://schemas.microsoft.com/office/powerpoint/2015/09/main" Requires="p159">
+      <p:transition xmlns:p14="http://schemas.microsoft.com/office/powerpoint/2010/main" spd="slow" p14:dur="2000">
+        <p159:morph option="byObject"/>
       </p:transition>
     </mc:Choice>
-    <mc:Fallback xmlns="">
-      <p:transition spd="med">
+    <mc:Fallback>
+      <p:transition spd="slow">
         <p:fade/>
       </p:transition>
     </mc:Fallback>
@@ -12514,14 +12821,14 @@
   <p:clrMapOvr>
     <a:masterClrMapping/>
   </p:clrMapOvr>
-  <mc:AlternateContent xmlns:mc="http://schemas.openxmlformats.org/markup-compatibility/2006" xmlns:p14="http://schemas.microsoft.com/office/powerpoint/2010/main">
-    <mc:Choice Requires="p14">
-      <p:transition spd="med" p14:dur="700">
-        <p:fade/>
+  <mc:AlternateContent xmlns:mc="http://schemas.openxmlformats.org/markup-compatibility/2006">
+    <mc:Choice xmlns:p159="http://schemas.microsoft.com/office/powerpoint/2015/09/main" Requires="p159">
+      <p:transition xmlns:p14="http://schemas.microsoft.com/office/powerpoint/2010/main" spd="slow" p14:dur="2000">
+        <p159:morph option="byObject"/>
       </p:transition>
     </mc:Choice>
-    <mc:Fallback xmlns="">
-      <p:transition spd="med">
+    <mc:Fallback>
+      <p:transition spd="slow">
         <p:fade/>
       </p:transition>
     </mc:Fallback>
@@ -13020,14 +13327,14 @@
   <p:clrMapOvr>
     <a:masterClrMapping/>
   </p:clrMapOvr>
-  <mc:AlternateContent xmlns:mc="http://schemas.openxmlformats.org/markup-compatibility/2006" xmlns:p14="http://schemas.microsoft.com/office/powerpoint/2010/main">
-    <mc:Choice Requires="p14">
-      <p:transition spd="med" p14:dur="700">
-        <p:fade/>
+  <mc:AlternateContent xmlns:mc="http://schemas.openxmlformats.org/markup-compatibility/2006">
+    <mc:Choice xmlns:p159="http://schemas.microsoft.com/office/powerpoint/2015/09/main" Requires="p159">
+      <p:transition xmlns:p14="http://schemas.microsoft.com/office/powerpoint/2010/main" spd="slow" p14:dur="2000">
+        <p159:morph option="byObject"/>
       </p:transition>
     </mc:Choice>
-    <mc:Fallback xmlns="">
-      <p:transition spd="med">
+    <mc:Fallback>
+      <p:transition spd="slow">
         <p:fade/>
       </p:transition>
     </mc:Fallback>
@@ -13470,14 +13777,14 @@
   <p:clrMapOvr>
     <a:masterClrMapping/>
   </p:clrMapOvr>
-  <mc:AlternateContent xmlns:mc="http://schemas.openxmlformats.org/markup-compatibility/2006" xmlns:p14="http://schemas.microsoft.com/office/powerpoint/2010/main">
-    <mc:Choice Requires="p14">
-      <p:transition spd="med" p14:dur="700">
-        <p:fade/>
+  <mc:AlternateContent xmlns:mc="http://schemas.openxmlformats.org/markup-compatibility/2006">
+    <mc:Choice xmlns:p159="http://schemas.microsoft.com/office/powerpoint/2015/09/main" Requires="p159">
+      <p:transition xmlns:p14="http://schemas.microsoft.com/office/powerpoint/2010/main" spd="slow" p14:dur="2000">
+        <p159:morph option="byObject"/>
       </p:transition>
     </mc:Choice>
-    <mc:Fallback xmlns="">
-      <p:transition spd="med">
+    <mc:Fallback>
+      <p:transition spd="slow">
         <p:fade/>
       </p:transition>
     </mc:Fallback>

</xml_diff>